<commit_message>
Add tasks and add presenation edits
</commit_message>
<xml_diff>
--- a/Diagrams/presentation.pptx
+++ b/Diagrams/presentation.pptx
@@ -6,9 +6,11 @@
   </p:sldMasterIdLst>
   <p:sldIdLst>
     <p:sldId id="256" r:id="rId2"/>
-    <p:sldId id="258" r:id="rId3"/>
-    <p:sldId id="257" r:id="rId4"/>
-    <p:sldId id="259" r:id="rId5"/>
+    <p:sldId id="261" r:id="rId3"/>
+    <p:sldId id="258" r:id="rId4"/>
+    <p:sldId id="257" r:id="rId5"/>
+    <p:sldId id="259" r:id="rId6"/>
+    <p:sldId id="260" r:id="rId7"/>
   </p:sldIdLst>
   <p:sldSz cx="12192000" cy="6858000"/>
   <p:notesSz cx="6858000" cy="9144000"/>
@@ -107,6 +109,11 @@
       </a:defRPr>
     </a:lvl9pPr>
   </p:defaultTextStyle>
+  <p:extLst>
+    <p:ext uri="{EFAFB233-063F-42B5-8137-9DF3F51BA10A}">
+      <p15:sldGuideLst xmlns:p15="http://schemas.microsoft.com/office/powerpoint/2012/main"/>
+    </p:ext>
+  </p:extLst>
 </p:presentation>
 </file>
 
@@ -259,7 +266,7 @@
           <a:p>
             <a:fld id="{4A7CD4B7-1896-40FA-BCB1-23D61EC865BA}" type="datetimeFigureOut">
               <a:rPr lang="en-GB" smtClean="0"/>
-              <a:t>29/10/2021</a:t>
+              <a:t>01/11/2021</a:t>
             </a:fld>
             <a:endParaRPr lang="en-GB"/>
           </a:p>
@@ -459,7 +466,7 @@
           <a:p>
             <a:fld id="{4A7CD4B7-1896-40FA-BCB1-23D61EC865BA}" type="datetimeFigureOut">
               <a:rPr lang="en-GB" smtClean="0"/>
-              <a:t>29/10/2021</a:t>
+              <a:t>01/11/2021</a:t>
             </a:fld>
             <a:endParaRPr lang="en-GB"/>
           </a:p>
@@ -669,7 +676,7 @@
           <a:p>
             <a:fld id="{4A7CD4B7-1896-40FA-BCB1-23D61EC865BA}" type="datetimeFigureOut">
               <a:rPr lang="en-GB" smtClean="0"/>
-              <a:t>29/10/2021</a:t>
+              <a:t>01/11/2021</a:t>
             </a:fld>
             <a:endParaRPr lang="en-GB"/>
           </a:p>
@@ -869,7 +876,7 @@
           <a:p>
             <a:fld id="{4A7CD4B7-1896-40FA-BCB1-23D61EC865BA}" type="datetimeFigureOut">
               <a:rPr lang="en-GB" smtClean="0"/>
-              <a:t>29/10/2021</a:t>
+              <a:t>01/11/2021</a:t>
             </a:fld>
             <a:endParaRPr lang="en-GB"/>
           </a:p>
@@ -1145,7 +1152,7 @@
           <a:p>
             <a:fld id="{4A7CD4B7-1896-40FA-BCB1-23D61EC865BA}" type="datetimeFigureOut">
               <a:rPr lang="en-GB" smtClean="0"/>
-              <a:t>29/10/2021</a:t>
+              <a:t>01/11/2021</a:t>
             </a:fld>
             <a:endParaRPr lang="en-GB"/>
           </a:p>
@@ -1413,7 +1420,7 @@
           <a:p>
             <a:fld id="{4A7CD4B7-1896-40FA-BCB1-23D61EC865BA}" type="datetimeFigureOut">
               <a:rPr lang="en-GB" smtClean="0"/>
-              <a:t>29/10/2021</a:t>
+              <a:t>01/11/2021</a:t>
             </a:fld>
             <a:endParaRPr lang="en-GB"/>
           </a:p>
@@ -1828,7 +1835,7 @@
           <a:p>
             <a:fld id="{4A7CD4B7-1896-40FA-BCB1-23D61EC865BA}" type="datetimeFigureOut">
               <a:rPr lang="en-GB" smtClean="0"/>
-              <a:t>29/10/2021</a:t>
+              <a:t>01/11/2021</a:t>
             </a:fld>
             <a:endParaRPr lang="en-GB"/>
           </a:p>
@@ -1970,7 +1977,7 @@
           <a:p>
             <a:fld id="{4A7CD4B7-1896-40FA-BCB1-23D61EC865BA}" type="datetimeFigureOut">
               <a:rPr lang="en-GB" smtClean="0"/>
-              <a:t>29/10/2021</a:t>
+              <a:t>01/11/2021</a:t>
             </a:fld>
             <a:endParaRPr lang="en-GB"/>
           </a:p>
@@ -2083,7 +2090,7 @@
           <a:p>
             <a:fld id="{4A7CD4B7-1896-40FA-BCB1-23D61EC865BA}" type="datetimeFigureOut">
               <a:rPr lang="en-GB" smtClean="0"/>
-              <a:t>29/10/2021</a:t>
+              <a:t>01/11/2021</a:t>
             </a:fld>
             <a:endParaRPr lang="en-GB"/>
           </a:p>
@@ -2396,7 +2403,7 @@
           <a:p>
             <a:fld id="{4A7CD4B7-1896-40FA-BCB1-23D61EC865BA}" type="datetimeFigureOut">
               <a:rPr lang="en-GB" smtClean="0"/>
-              <a:t>29/10/2021</a:t>
+              <a:t>01/11/2021</a:t>
             </a:fld>
             <a:endParaRPr lang="en-GB"/>
           </a:p>
@@ -2685,7 +2692,7 @@
           <a:p>
             <a:fld id="{4A7CD4B7-1896-40FA-BCB1-23D61EC865BA}" type="datetimeFigureOut">
               <a:rPr lang="en-GB" smtClean="0"/>
-              <a:t>29/10/2021</a:t>
+              <a:t>01/11/2021</a:t>
             </a:fld>
             <a:endParaRPr lang="en-GB"/>
           </a:p>
@@ -2928,7 +2935,7 @@
           <a:p>
             <a:fld id="{4A7CD4B7-1896-40FA-BCB1-23D61EC865BA}" type="datetimeFigureOut">
               <a:rPr lang="en-GB" smtClean="0"/>
-              <a:t>29/10/2021</a:t>
+              <a:t>01/11/2021</a:t>
             </a:fld>
             <a:endParaRPr lang="en-GB"/>
           </a:p>
@@ -3411,6 +3418,137 @@
 <file path=ppt/slides/slide2.xml><?xml version="1.0" encoding="utf-8"?>
 <p:sld xmlns:a="http://schemas.openxmlformats.org/drawingml/2006/main" xmlns:r="http://schemas.openxmlformats.org/officeDocument/2006/relationships" xmlns:p="http://schemas.openxmlformats.org/presentationml/2006/main">
   <p:cSld>
+    <p:spTree>
+      <p:nvGrpSpPr>
+        <p:cNvPr id="1" name=""/>
+        <p:cNvGrpSpPr/>
+        <p:nvPr/>
+      </p:nvGrpSpPr>
+      <p:grpSpPr>
+        <a:xfrm>
+          <a:off x="0" y="0"/>
+          <a:ext cx="0" cy="0"/>
+          <a:chOff x="0" y="0"/>
+          <a:chExt cx="0" cy="0"/>
+        </a:xfrm>
+      </p:grpSpPr>
+      <p:sp>
+        <p:nvSpPr>
+          <p:cNvPr id="2" name="Title 1">
+            <a:extLst>
+              <a:ext uri="{FF2B5EF4-FFF2-40B4-BE49-F238E27FC236}">
+                <a16:creationId xmlns:a16="http://schemas.microsoft.com/office/drawing/2014/main" id="{873DCBFF-6A52-4F3D-9932-E9C1900FD5D7}"/>
+              </a:ext>
+            </a:extLst>
+          </p:cNvPr>
+          <p:cNvSpPr>
+            <a:spLocks noGrp="1"/>
+          </p:cNvSpPr>
+          <p:nvPr>
+            <p:ph type="title"/>
+          </p:nvPr>
+        </p:nvSpPr>
+        <p:spPr/>
+        <p:txBody>
+          <a:bodyPr/>
+          <a:lstStyle/>
+          <a:p>
+            <a:r>
+              <a:rPr lang="en-GB" dirty="0"/>
+              <a:t>Disadvantages</a:t>
+            </a:r>
+          </a:p>
+        </p:txBody>
+      </p:sp>
+      <p:sp>
+        <p:nvSpPr>
+          <p:cNvPr id="3" name="Content Placeholder 2">
+            <a:extLst>
+              <a:ext uri="{FF2B5EF4-FFF2-40B4-BE49-F238E27FC236}">
+                <a16:creationId xmlns:a16="http://schemas.microsoft.com/office/drawing/2014/main" id="{DBE25B3C-5785-4F3F-94F3-FF325F1CEC1F}"/>
+              </a:ext>
+            </a:extLst>
+          </p:cNvPr>
+          <p:cNvSpPr>
+            <a:spLocks noGrp="1"/>
+          </p:cNvSpPr>
+          <p:nvPr>
+            <p:ph idx="1"/>
+          </p:nvPr>
+        </p:nvSpPr>
+        <p:spPr/>
+        <p:txBody>
+          <a:bodyPr>
+            <a:normAutofit lnSpcReduction="10000"/>
+          </a:bodyPr>
+          <a:lstStyle/>
+          <a:p>
+            <a:r>
+              <a:rPr lang="en-GB" dirty="0"/>
+              <a:t>Flexibility can be overwhelming when the chosen use case is not the default</a:t>
+            </a:r>
+          </a:p>
+          <a:p>
+            <a:r>
+              <a:rPr lang="en-GB" dirty="0"/>
+              <a:t>Documentation is good however the info is not up-to date or info for specific use cases are difficult to be found</a:t>
+            </a:r>
+          </a:p>
+          <a:p>
+            <a:r>
+              <a:rPr lang="en-GB" dirty="0"/>
+              <a:t>The website has decent documentation and snippets of code but they lack comprehension</a:t>
+            </a:r>
+          </a:p>
+          <a:p>
+            <a:r>
+              <a:rPr lang="en-GB" dirty="0"/>
+              <a:t>It needs to be tuned to get the benefit of speed and scalability</a:t>
+            </a:r>
+          </a:p>
+          <a:p>
+            <a:r>
+              <a:rPr lang="en-GB" dirty="0"/>
+              <a:t>Lack of GUI controller like e.g. IBM MQ</a:t>
+            </a:r>
+          </a:p>
+          <a:p>
+            <a:endParaRPr lang="en-GB" dirty="0"/>
+          </a:p>
+          <a:p>
+            <a:pPr marL="0" indent="0">
+              <a:buNone/>
+            </a:pPr>
+            <a:r>
+              <a:rPr lang="en-GB" sz="1200" dirty="0"/>
+              <a:t>									source: </a:t>
+            </a:r>
+            <a:r>
+              <a:rPr lang="en-GB" sz="1200" dirty="0">
+                <a:hlinkClick r:id="rId2"/>
+              </a:rPr>
+              <a:t>The Uplink</a:t>
+            </a:r>
+            <a:endParaRPr lang="en-GB" sz="1200" dirty="0"/>
+          </a:p>
+        </p:txBody>
+      </p:sp>
+    </p:spTree>
+    <p:extLst>
+      <p:ext uri="{BB962C8B-B14F-4D97-AF65-F5344CB8AC3E}">
+        <p14:creationId xmlns:p14="http://schemas.microsoft.com/office/powerpoint/2010/main" val="306957588"/>
+      </p:ext>
+    </p:extLst>
+  </p:cSld>
+  <p:clrMapOvr>
+    <a:masterClrMapping/>
+  </p:clrMapOvr>
+</p:sld>
+</file>
+
+<file path=ppt/slides/slide3.xml><?xml version="1.0" encoding="utf-8"?>
+<p:sld xmlns:a="http://schemas.openxmlformats.org/drawingml/2006/main" xmlns:r="http://schemas.openxmlformats.org/officeDocument/2006/relationships" xmlns:p="http://schemas.openxmlformats.org/presentationml/2006/main">
+  <p:cSld>
     <p:bg>
       <p:bgPr>
         <a:solidFill>
@@ -3593,7 +3731,7 @@
 </p:sld>
 </file>
 
-<file path=ppt/slides/slide3.xml><?xml version="1.0" encoding="utf-8"?>
+<file path=ppt/slides/slide4.xml><?xml version="1.0" encoding="utf-8"?>
 <p:sld xmlns:a="http://schemas.openxmlformats.org/drawingml/2006/main" xmlns:r="http://schemas.openxmlformats.org/officeDocument/2006/relationships" xmlns:p="http://schemas.openxmlformats.org/presentationml/2006/main">
   <p:cSld>
     <p:bg>
@@ -4382,7 +4520,7 @@
 </p:sld>
 </file>
 
-<file path=ppt/slides/slide4.xml><?xml version="1.0" encoding="utf-8"?>
+<file path=ppt/slides/slide5.xml><?xml version="1.0" encoding="utf-8"?>
 <p:sld xmlns:a="http://schemas.openxmlformats.org/drawingml/2006/main" xmlns:r="http://schemas.openxmlformats.org/officeDocument/2006/relationships" xmlns:p="http://schemas.openxmlformats.org/presentationml/2006/main">
   <p:cSld>
     <p:bg>
@@ -4557,6 +4695,146 @@
     <p:extLst>
       <p:ext uri="{BB962C8B-B14F-4D97-AF65-F5344CB8AC3E}">
         <p14:creationId xmlns:p14="http://schemas.microsoft.com/office/powerpoint/2010/main" val="519859550"/>
+      </p:ext>
+    </p:extLst>
+  </p:cSld>
+  <p:clrMapOvr>
+    <a:masterClrMapping/>
+  </p:clrMapOvr>
+</p:sld>
+</file>
+
+<file path=ppt/slides/slide6.xml><?xml version="1.0" encoding="utf-8"?>
+<p:sld xmlns:a="http://schemas.openxmlformats.org/drawingml/2006/main" xmlns:r="http://schemas.openxmlformats.org/officeDocument/2006/relationships" xmlns:p="http://schemas.openxmlformats.org/presentationml/2006/main">
+  <p:cSld>
+    <p:spTree>
+      <p:nvGrpSpPr>
+        <p:cNvPr id="1" name=""/>
+        <p:cNvGrpSpPr/>
+        <p:nvPr/>
+      </p:nvGrpSpPr>
+      <p:grpSpPr>
+        <a:xfrm>
+          <a:off x="0" y="0"/>
+          <a:ext cx="0" cy="0"/>
+          <a:chOff x="0" y="0"/>
+          <a:chExt cx="0" cy="0"/>
+        </a:xfrm>
+      </p:grpSpPr>
+      <p:sp>
+        <p:nvSpPr>
+          <p:cNvPr id="2" name="Title 1">
+            <a:extLst>
+              <a:ext uri="{FF2B5EF4-FFF2-40B4-BE49-F238E27FC236}">
+                <a16:creationId xmlns:a16="http://schemas.microsoft.com/office/drawing/2014/main" id="{7905FCBB-5F96-4436-B97D-E0449C7FEF0D}"/>
+              </a:ext>
+            </a:extLst>
+          </p:cNvPr>
+          <p:cNvSpPr>
+            <a:spLocks noGrp="1"/>
+          </p:cNvSpPr>
+          <p:nvPr>
+            <p:ph type="title"/>
+          </p:nvPr>
+        </p:nvSpPr>
+        <p:spPr/>
+        <p:txBody>
+          <a:bodyPr/>
+          <a:lstStyle/>
+          <a:p>
+            <a:r>
+              <a:rPr lang="en-GB" dirty="0"/>
+              <a:t>Future of ActiveMQ</a:t>
+            </a:r>
+          </a:p>
+        </p:txBody>
+      </p:sp>
+      <p:sp>
+        <p:nvSpPr>
+          <p:cNvPr id="3" name="Content Placeholder 2">
+            <a:extLst>
+              <a:ext uri="{FF2B5EF4-FFF2-40B4-BE49-F238E27FC236}">
+                <a16:creationId xmlns:a16="http://schemas.microsoft.com/office/drawing/2014/main" id="{B282AD2E-2AB3-400F-A4F2-3B2E17E02278}"/>
+              </a:ext>
+            </a:extLst>
+          </p:cNvPr>
+          <p:cNvSpPr>
+            <a:spLocks noGrp="1"/>
+          </p:cNvSpPr>
+          <p:nvPr>
+            <p:ph idx="1"/>
+          </p:nvPr>
+        </p:nvSpPr>
+        <p:spPr/>
+        <p:txBody>
+          <a:bodyPr>
+            <a:normAutofit/>
+          </a:bodyPr>
+          <a:lstStyle/>
+          <a:p>
+            <a:r>
+              <a:rPr lang="en-GB" dirty="0"/>
+              <a:t>Current ActiveMQ 5.X </a:t>
+            </a:r>
+          </a:p>
+          <a:p>
+            <a:r>
+              <a:rPr lang="en-GB" dirty="0"/>
+              <a:t>Will be replaced by ActiveMQ Artemis </a:t>
+            </a:r>
+            <a:r>
+              <a:rPr lang="en-GB" dirty="0">
+                <a:sym typeface="Wingdings" panose="05000000000000000000" pitchFamily="2" charset="2"/>
+              </a:rPr>
+              <a:t> ActiveMQ 6.X</a:t>
+            </a:r>
+          </a:p>
+          <a:p>
+            <a:r>
+              <a:rPr lang="en-GB" dirty="0"/>
+              <a:t>ActiveMQ Artemis has more potential</a:t>
+            </a:r>
+          </a:p>
+          <a:p>
+            <a:endParaRPr lang="en-GB" dirty="0"/>
+          </a:p>
+          <a:p>
+            <a:endParaRPr lang="en-GB" dirty="0"/>
+          </a:p>
+          <a:p>
+            <a:pPr marL="0" indent="0">
+              <a:buNone/>
+            </a:pPr>
+            <a:endParaRPr lang="en-GB" dirty="0"/>
+          </a:p>
+          <a:p>
+            <a:pPr marL="0" indent="0">
+              <a:buNone/>
+            </a:pPr>
+            <a:endParaRPr lang="en-GB" dirty="0"/>
+          </a:p>
+          <a:p>
+            <a:pPr marL="0" indent="0">
+              <a:buNone/>
+            </a:pPr>
+            <a:r>
+              <a:rPr lang="en-GB" sz="1200" dirty="0"/>
+              <a:t>									source: </a:t>
+            </a:r>
+            <a:r>
+              <a:rPr lang="en-GB" sz="1200" dirty="0">
+                <a:hlinkClick r:id="rId2"/>
+              </a:rPr>
+              <a:t>activemq.apache.org</a:t>
+            </a:r>
+            <a:endParaRPr lang="en-GB" sz="1200" dirty="0"/>
+          </a:p>
+        </p:txBody>
+      </p:sp>
+    </p:spTree>
+    <p:extLst>
+      <p:ext uri="{BB962C8B-B14F-4D97-AF65-F5344CB8AC3E}">
+        <p14:creationId xmlns:p14="http://schemas.microsoft.com/office/powerpoint/2010/main" val="3621271879"/>
       </p:ext>
     </p:extLst>
   </p:cSld>

</xml_diff>

<commit_message>
Add new request and reply project
</commit_message>
<xml_diff>
--- a/Diagrams/presentation.pptx
+++ b/Diagrams/presentation.pptx
@@ -4,6 +4,9 @@
   <p:sldMasterIdLst>
     <p:sldMasterId id="2147483648" r:id="rId1"/>
   </p:sldMasterIdLst>
+  <p:notesMasterIdLst>
+    <p:notesMasterId r:id="rId10"/>
+  </p:notesMasterIdLst>
   <p:sldIdLst>
     <p:sldId id="256" r:id="rId2"/>
     <p:sldId id="261" r:id="rId3"/>
@@ -11,7 +14,8 @@
     <p:sldId id="257" r:id="rId5"/>
     <p:sldId id="259" r:id="rId6"/>
     <p:sldId id="262" r:id="rId7"/>
-    <p:sldId id="260" r:id="rId8"/>
+    <p:sldId id="263" r:id="rId8"/>
+    <p:sldId id="260" r:id="rId9"/>
   </p:sldIdLst>
   <p:sldSz cx="12192000" cy="6858000"/>
   <p:notesSz cx="6858000" cy="9144000"/>
@@ -118,6 +122,440 @@
 </p:presentation>
 </file>
 
+<file path=ppt/notesMasters/notesMaster1.xml><?xml version="1.0" encoding="utf-8"?>
+<p:notesMaster xmlns:a="http://schemas.openxmlformats.org/drawingml/2006/main" xmlns:r="http://schemas.openxmlformats.org/officeDocument/2006/relationships" xmlns:p="http://schemas.openxmlformats.org/presentationml/2006/main">
+  <p:cSld>
+    <p:bg>
+      <p:bgRef idx="1001">
+        <a:schemeClr val="bg1"/>
+      </p:bgRef>
+    </p:bg>
+    <p:spTree>
+      <p:nvGrpSpPr>
+        <p:cNvPr id="1" name=""/>
+        <p:cNvGrpSpPr/>
+        <p:nvPr/>
+      </p:nvGrpSpPr>
+      <p:grpSpPr>
+        <a:xfrm>
+          <a:off x="0" y="0"/>
+          <a:ext cx="0" cy="0"/>
+          <a:chOff x="0" y="0"/>
+          <a:chExt cx="0" cy="0"/>
+        </a:xfrm>
+      </p:grpSpPr>
+      <p:sp>
+        <p:nvSpPr>
+          <p:cNvPr id="2" name="Header Placeholder 1"/>
+          <p:cNvSpPr>
+            <a:spLocks noGrp="1"/>
+          </p:cNvSpPr>
+          <p:nvPr>
+            <p:ph type="hdr" sz="quarter"/>
+          </p:nvPr>
+        </p:nvSpPr>
+        <p:spPr>
+          <a:xfrm>
+            <a:off x="0" y="0"/>
+            <a:ext cx="2971800" cy="458788"/>
+          </a:xfrm>
+          <a:prstGeom prst="rect">
+            <a:avLst/>
+          </a:prstGeom>
+        </p:spPr>
+        <p:txBody>
+          <a:bodyPr vert="horz" lIns="91440" tIns="45720" rIns="91440" bIns="45720" rtlCol="0"/>
+          <a:lstStyle>
+            <a:lvl1pPr algn="l">
+              <a:defRPr sz="1200"/>
+            </a:lvl1pPr>
+          </a:lstStyle>
+          <a:p>
+            <a:endParaRPr lang="en-GB"/>
+          </a:p>
+        </p:txBody>
+      </p:sp>
+      <p:sp>
+        <p:nvSpPr>
+          <p:cNvPr id="3" name="Date Placeholder 2"/>
+          <p:cNvSpPr>
+            <a:spLocks noGrp="1"/>
+          </p:cNvSpPr>
+          <p:nvPr>
+            <p:ph type="dt" idx="1"/>
+          </p:nvPr>
+        </p:nvSpPr>
+        <p:spPr>
+          <a:xfrm>
+            <a:off x="3884613" y="0"/>
+            <a:ext cx="2971800" cy="458788"/>
+          </a:xfrm>
+          <a:prstGeom prst="rect">
+            <a:avLst/>
+          </a:prstGeom>
+        </p:spPr>
+        <p:txBody>
+          <a:bodyPr vert="horz" lIns="91440" tIns="45720" rIns="91440" bIns="45720" rtlCol="0"/>
+          <a:lstStyle>
+            <a:lvl1pPr algn="r">
+              <a:defRPr sz="1200"/>
+            </a:lvl1pPr>
+          </a:lstStyle>
+          <a:p>
+            <a:fld id="{54A27AA5-BAF5-4588-B817-E7F5BF22FE0A}" type="datetimeFigureOut">
+              <a:rPr lang="en-GB" smtClean="0"/>
+              <a:t>02/11/2021</a:t>
+            </a:fld>
+            <a:endParaRPr lang="en-GB"/>
+          </a:p>
+        </p:txBody>
+      </p:sp>
+      <p:sp>
+        <p:nvSpPr>
+          <p:cNvPr id="4" name="Slide Image Placeholder 3"/>
+          <p:cNvSpPr>
+            <a:spLocks noGrp="1" noRot="1" noChangeAspect="1"/>
+          </p:cNvSpPr>
+          <p:nvPr>
+            <p:ph type="sldImg" idx="2"/>
+          </p:nvPr>
+        </p:nvSpPr>
+        <p:spPr>
+          <a:xfrm>
+            <a:off x="685800" y="1143000"/>
+            <a:ext cx="5486400" cy="3086100"/>
+          </a:xfrm>
+          <a:prstGeom prst="rect">
+            <a:avLst/>
+          </a:prstGeom>
+          <a:noFill/>
+          <a:ln w="12700">
+            <a:solidFill>
+              <a:prstClr val="black"/>
+            </a:solidFill>
+          </a:ln>
+        </p:spPr>
+        <p:txBody>
+          <a:bodyPr vert="horz" lIns="91440" tIns="45720" rIns="91440" bIns="45720" rtlCol="0" anchor="ctr"/>
+          <a:lstStyle/>
+          <a:p>
+            <a:endParaRPr lang="en-GB"/>
+          </a:p>
+        </p:txBody>
+      </p:sp>
+      <p:sp>
+        <p:nvSpPr>
+          <p:cNvPr id="5" name="Notes Placeholder 4"/>
+          <p:cNvSpPr>
+            <a:spLocks noGrp="1"/>
+          </p:cNvSpPr>
+          <p:nvPr>
+            <p:ph type="body" sz="quarter" idx="3"/>
+          </p:nvPr>
+        </p:nvSpPr>
+        <p:spPr>
+          <a:xfrm>
+            <a:off x="685800" y="4400550"/>
+            <a:ext cx="5486400" cy="3600450"/>
+          </a:xfrm>
+          <a:prstGeom prst="rect">
+            <a:avLst/>
+          </a:prstGeom>
+        </p:spPr>
+        <p:txBody>
+          <a:bodyPr vert="horz" lIns="91440" tIns="45720" rIns="91440" bIns="45720" rtlCol="0"/>
+          <a:lstStyle/>
+          <a:p>
+            <a:pPr lvl="0"/>
+            <a:r>
+              <a:rPr lang="en-US"/>
+              <a:t>Click to edit Master text styles</a:t>
+            </a:r>
+          </a:p>
+          <a:p>
+            <a:pPr lvl="1"/>
+            <a:r>
+              <a:rPr lang="en-US"/>
+              <a:t>Second level</a:t>
+            </a:r>
+          </a:p>
+          <a:p>
+            <a:pPr lvl="2"/>
+            <a:r>
+              <a:rPr lang="en-US"/>
+              <a:t>Third level</a:t>
+            </a:r>
+          </a:p>
+          <a:p>
+            <a:pPr lvl="3"/>
+            <a:r>
+              <a:rPr lang="en-US"/>
+              <a:t>Fourth level</a:t>
+            </a:r>
+          </a:p>
+          <a:p>
+            <a:pPr lvl="4"/>
+            <a:r>
+              <a:rPr lang="en-US"/>
+              <a:t>Fifth level</a:t>
+            </a:r>
+            <a:endParaRPr lang="en-GB"/>
+          </a:p>
+        </p:txBody>
+      </p:sp>
+      <p:sp>
+        <p:nvSpPr>
+          <p:cNvPr id="6" name="Footer Placeholder 5"/>
+          <p:cNvSpPr>
+            <a:spLocks noGrp="1"/>
+          </p:cNvSpPr>
+          <p:nvPr>
+            <p:ph type="ftr" sz="quarter" idx="4"/>
+          </p:nvPr>
+        </p:nvSpPr>
+        <p:spPr>
+          <a:xfrm>
+            <a:off x="0" y="8685213"/>
+            <a:ext cx="2971800" cy="458787"/>
+          </a:xfrm>
+          <a:prstGeom prst="rect">
+            <a:avLst/>
+          </a:prstGeom>
+        </p:spPr>
+        <p:txBody>
+          <a:bodyPr vert="horz" lIns="91440" tIns="45720" rIns="91440" bIns="45720" rtlCol="0" anchor="b"/>
+          <a:lstStyle>
+            <a:lvl1pPr algn="l">
+              <a:defRPr sz="1200"/>
+            </a:lvl1pPr>
+          </a:lstStyle>
+          <a:p>
+            <a:endParaRPr lang="en-GB"/>
+          </a:p>
+        </p:txBody>
+      </p:sp>
+      <p:sp>
+        <p:nvSpPr>
+          <p:cNvPr id="7" name="Slide Number Placeholder 6"/>
+          <p:cNvSpPr>
+            <a:spLocks noGrp="1"/>
+          </p:cNvSpPr>
+          <p:nvPr>
+            <p:ph type="sldNum" sz="quarter" idx="5"/>
+          </p:nvPr>
+        </p:nvSpPr>
+        <p:spPr>
+          <a:xfrm>
+            <a:off x="3884613" y="8685213"/>
+            <a:ext cx="2971800" cy="458787"/>
+          </a:xfrm>
+          <a:prstGeom prst="rect">
+            <a:avLst/>
+          </a:prstGeom>
+        </p:spPr>
+        <p:txBody>
+          <a:bodyPr vert="horz" lIns="91440" tIns="45720" rIns="91440" bIns="45720" rtlCol="0" anchor="b"/>
+          <a:lstStyle>
+            <a:lvl1pPr algn="r">
+              <a:defRPr sz="1200"/>
+            </a:lvl1pPr>
+          </a:lstStyle>
+          <a:p>
+            <a:fld id="{9CD0AFCF-035F-44D7-A598-3B17142E29A2}" type="slidenum">
+              <a:rPr lang="en-GB" smtClean="0"/>
+              <a:t>‹#›</a:t>
+            </a:fld>
+            <a:endParaRPr lang="en-GB"/>
+          </a:p>
+        </p:txBody>
+      </p:sp>
+    </p:spTree>
+    <p:extLst>
+      <p:ext uri="{BB962C8B-B14F-4D97-AF65-F5344CB8AC3E}">
+        <p14:creationId xmlns:p14="http://schemas.microsoft.com/office/powerpoint/2010/main" val="1450844974"/>
+      </p:ext>
+    </p:extLst>
+  </p:cSld>
+  <p:clrMap bg1="lt1" tx1="dk1" bg2="lt2" tx2="dk2" accent1="accent1" accent2="accent2" accent3="accent3" accent4="accent4" accent5="accent5" accent6="accent6" hlink="hlink" folHlink="folHlink"/>
+  <p:notesStyle>
+    <a:lvl1pPr marL="0" algn="l" defTabSz="914400" rtl="0" eaLnBrk="1" latinLnBrk="0" hangingPunct="1">
+      <a:defRPr sz="1200" kern="1200">
+        <a:solidFill>
+          <a:schemeClr val="tx1"/>
+        </a:solidFill>
+        <a:latin typeface="+mn-lt"/>
+        <a:ea typeface="+mn-ea"/>
+        <a:cs typeface="+mn-cs"/>
+      </a:defRPr>
+    </a:lvl1pPr>
+    <a:lvl2pPr marL="457200" algn="l" defTabSz="914400" rtl="0" eaLnBrk="1" latinLnBrk="0" hangingPunct="1">
+      <a:defRPr sz="1200" kern="1200">
+        <a:solidFill>
+          <a:schemeClr val="tx1"/>
+        </a:solidFill>
+        <a:latin typeface="+mn-lt"/>
+        <a:ea typeface="+mn-ea"/>
+        <a:cs typeface="+mn-cs"/>
+      </a:defRPr>
+    </a:lvl2pPr>
+    <a:lvl3pPr marL="914400" algn="l" defTabSz="914400" rtl="0" eaLnBrk="1" latinLnBrk="0" hangingPunct="1">
+      <a:defRPr sz="1200" kern="1200">
+        <a:solidFill>
+          <a:schemeClr val="tx1"/>
+        </a:solidFill>
+        <a:latin typeface="+mn-lt"/>
+        <a:ea typeface="+mn-ea"/>
+        <a:cs typeface="+mn-cs"/>
+      </a:defRPr>
+    </a:lvl3pPr>
+    <a:lvl4pPr marL="1371600" algn="l" defTabSz="914400" rtl="0" eaLnBrk="1" latinLnBrk="0" hangingPunct="1">
+      <a:defRPr sz="1200" kern="1200">
+        <a:solidFill>
+          <a:schemeClr val="tx1"/>
+        </a:solidFill>
+        <a:latin typeface="+mn-lt"/>
+        <a:ea typeface="+mn-ea"/>
+        <a:cs typeface="+mn-cs"/>
+      </a:defRPr>
+    </a:lvl4pPr>
+    <a:lvl5pPr marL="1828800" algn="l" defTabSz="914400" rtl="0" eaLnBrk="1" latinLnBrk="0" hangingPunct="1">
+      <a:defRPr sz="1200" kern="1200">
+        <a:solidFill>
+          <a:schemeClr val="tx1"/>
+        </a:solidFill>
+        <a:latin typeface="+mn-lt"/>
+        <a:ea typeface="+mn-ea"/>
+        <a:cs typeface="+mn-cs"/>
+      </a:defRPr>
+    </a:lvl5pPr>
+    <a:lvl6pPr marL="2286000" algn="l" defTabSz="914400" rtl="0" eaLnBrk="1" latinLnBrk="0" hangingPunct="1">
+      <a:defRPr sz="1200" kern="1200">
+        <a:solidFill>
+          <a:schemeClr val="tx1"/>
+        </a:solidFill>
+        <a:latin typeface="+mn-lt"/>
+        <a:ea typeface="+mn-ea"/>
+        <a:cs typeface="+mn-cs"/>
+      </a:defRPr>
+    </a:lvl6pPr>
+    <a:lvl7pPr marL="2743200" algn="l" defTabSz="914400" rtl="0" eaLnBrk="1" latinLnBrk="0" hangingPunct="1">
+      <a:defRPr sz="1200" kern="1200">
+        <a:solidFill>
+          <a:schemeClr val="tx1"/>
+        </a:solidFill>
+        <a:latin typeface="+mn-lt"/>
+        <a:ea typeface="+mn-ea"/>
+        <a:cs typeface="+mn-cs"/>
+      </a:defRPr>
+    </a:lvl7pPr>
+    <a:lvl8pPr marL="3200400" algn="l" defTabSz="914400" rtl="0" eaLnBrk="1" latinLnBrk="0" hangingPunct="1">
+      <a:defRPr sz="1200" kern="1200">
+        <a:solidFill>
+          <a:schemeClr val="tx1"/>
+        </a:solidFill>
+        <a:latin typeface="+mn-lt"/>
+        <a:ea typeface="+mn-ea"/>
+        <a:cs typeface="+mn-cs"/>
+      </a:defRPr>
+    </a:lvl8pPr>
+    <a:lvl9pPr marL="3657600" algn="l" defTabSz="914400" rtl="0" eaLnBrk="1" latinLnBrk="0" hangingPunct="1">
+      <a:defRPr sz="1200" kern="1200">
+        <a:solidFill>
+          <a:schemeClr val="tx1"/>
+        </a:solidFill>
+        <a:latin typeface="+mn-lt"/>
+        <a:ea typeface="+mn-ea"/>
+        <a:cs typeface="+mn-cs"/>
+      </a:defRPr>
+    </a:lvl9pPr>
+  </p:notesStyle>
+</p:notesMaster>
+</file>
+
+<file path=ppt/notesSlides/notesSlide1.xml><?xml version="1.0" encoding="utf-8"?>
+<p:notes xmlns:a="http://schemas.openxmlformats.org/drawingml/2006/main" xmlns:r="http://schemas.openxmlformats.org/officeDocument/2006/relationships" xmlns:p="http://schemas.openxmlformats.org/presentationml/2006/main">
+  <p:cSld>
+    <p:spTree>
+      <p:nvGrpSpPr>
+        <p:cNvPr id="1" name=""/>
+        <p:cNvGrpSpPr/>
+        <p:nvPr/>
+      </p:nvGrpSpPr>
+      <p:grpSpPr>
+        <a:xfrm>
+          <a:off x="0" y="0"/>
+          <a:ext cx="0" cy="0"/>
+          <a:chOff x="0" y="0"/>
+          <a:chExt cx="0" cy="0"/>
+        </a:xfrm>
+      </p:grpSpPr>
+      <p:sp>
+        <p:nvSpPr>
+          <p:cNvPr id="2" name="Slide Image Placeholder 1"/>
+          <p:cNvSpPr>
+            <a:spLocks noGrp="1" noRot="1" noChangeAspect="1"/>
+          </p:cNvSpPr>
+          <p:nvPr>
+            <p:ph type="sldImg"/>
+          </p:nvPr>
+        </p:nvSpPr>
+        <p:spPr/>
+      </p:sp>
+      <p:sp>
+        <p:nvSpPr>
+          <p:cNvPr id="3" name="Notes Placeholder 2"/>
+          <p:cNvSpPr>
+            <a:spLocks noGrp="1"/>
+          </p:cNvSpPr>
+          <p:nvPr>
+            <p:ph type="body" idx="1"/>
+          </p:nvPr>
+        </p:nvSpPr>
+        <p:spPr/>
+        <p:txBody>
+          <a:bodyPr/>
+          <a:lstStyle/>
+          <a:p>
+            <a:endParaRPr lang="en-GB" dirty="0"/>
+          </a:p>
+        </p:txBody>
+      </p:sp>
+      <p:sp>
+        <p:nvSpPr>
+          <p:cNvPr id="4" name="Slide Number Placeholder 3"/>
+          <p:cNvSpPr>
+            <a:spLocks noGrp="1"/>
+          </p:cNvSpPr>
+          <p:nvPr>
+            <p:ph type="sldNum" sz="quarter" idx="5"/>
+          </p:nvPr>
+        </p:nvSpPr>
+        <p:spPr/>
+        <p:txBody>
+          <a:bodyPr/>
+          <a:lstStyle/>
+          <a:p>
+            <a:fld id="{9CD0AFCF-035F-44D7-A598-3B17142E29A2}" type="slidenum">
+              <a:rPr lang="en-GB" smtClean="0"/>
+              <a:t>7</a:t>
+            </a:fld>
+            <a:endParaRPr lang="en-GB"/>
+          </a:p>
+        </p:txBody>
+      </p:sp>
+    </p:spTree>
+    <p:extLst>
+      <p:ext uri="{BB962C8B-B14F-4D97-AF65-F5344CB8AC3E}">
+        <p14:creationId xmlns:p14="http://schemas.microsoft.com/office/powerpoint/2010/main" val="2714879223"/>
+      </p:ext>
+    </p:extLst>
+  </p:cSld>
+  <p:clrMapOvr>
+    <a:masterClrMapping/>
+  </p:clrMapOvr>
+</p:notes>
+</file>
+
 <file path=ppt/slideLayouts/slideLayout1.xml><?xml version="1.0" encoding="utf-8"?>
 <p:sldLayout xmlns:a="http://schemas.openxmlformats.org/drawingml/2006/main" xmlns:r="http://schemas.openxmlformats.org/officeDocument/2006/relationships" xmlns:p="http://schemas.openxmlformats.org/presentationml/2006/main" type="title" preserve="1">
   <p:cSld name="Title Slide">
@@ -267,7 +705,7 @@
           <a:p>
             <a:fld id="{4A7CD4B7-1896-40FA-BCB1-23D61EC865BA}" type="datetimeFigureOut">
               <a:rPr lang="en-GB" smtClean="0"/>
-              <a:t>01/11/2021</a:t>
+              <a:t>02/11/2021</a:t>
             </a:fld>
             <a:endParaRPr lang="en-GB"/>
           </a:p>
@@ -467,7 +905,7 @@
           <a:p>
             <a:fld id="{4A7CD4B7-1896-40FA-BCB1-23D61EC865BA}" type="datetimeFigureOut">
               <a:rPr lang="en-GB" smtClean="0"/>
-              <a:t>01/11/2021</a:t>
+              <a:t>02/11/2021</a:t>
             </a:fld>
             <a:endParaRPr lang="en-GB"/>
           </a:p>
@@ -677,7 +1115,7 @@
           <a:p>
             <a:fld id="{4A7CD4B7-1896-40FA-BCB1-23D61EC865BA}" type="datetimeFigureOut">
               <a:rPr lang="en-GB" smtClean="0"/>
-              <a:t>01/11/2021</a:t>
+              <a:t>02/11/2021</a:t>
             </a:fld>
             <a:endParaRPr lang="en-GB"/>
           </a:p>
@@ -877,7 +1315,7 @@
           <a:p>
             <a:fld id="{4A7CD4B7-1896-40FA-BCB1-23D61EC865BA}" type="datetimeFigureOut">
               <a:rPr lang="en-GB" smtClean="0"/>
-              <a:t>01/11/2021</a:t>
+              <a:t>02/11/2021</a:t>
             </a:fld>
             <a:endParaRPr lang="en-GB"/>
           </a:p>
@@ -1153,7 +1591,7 @@
           <a:p>
             <a:fld id="{4A7CD4B7-1896-40FA-BCB1-23D61EC865BA}" type="datetimeFigureOut">
               <a:rPr lang="en-GB" smtClean="0"/>
-              <a:t>01/11/2021</a:t>
+              <a:t>02/11/2021</a:t>
             </a:fld>
             <a:endParaRPr lang="en-GB"/>
           </a:p>
@@ -1421,7 +1859,7 @@
           <a:p>
             <a:fld id="{4A7CD4B7-1896-40FA-BCB1-23D61EC865BA}" type="datetimeFigureOut">
               <a:rPr lang="en-GB" smtClean="0"/>
-              <a:t>01/11/2021</a:t>
+              <a:t>02/11/2021</a:t>
             </a:fld>
             <a:endParaRPr lang="en-GB"/>
           </a:p>
@@ -1836,7 +2274,7 @@
           <a:p>
             <a:fld id="{4A7CD4B7-1896-40FA-BCB1-23D61EC865BA}" type="datetimeFigureOut">
               <a:rPr lang="en-GB" smtClean="0"/>
-              <a:t>01/11/2021</a:t>
+              <a:t>02/11/2021</a:t>
             </a:fld>
             <a:endParaRPr lang="en-GB"/>
           </a:p>
@@ -1978,7 +2416,7 @@
           <a:p>
             <a:fld id="{4A7CD4B7-1896-40FA-BCB1-23D61EC865BA}" type="datetimeFigureOut">
               <a:rPr lang="en-GB" smtClean="0"/>
-              <a:t>01/11/2021</a:t>
+              <a:t>02/11/2021</a:t>
             </a:fld>
             <a:endParaRPr lang="en-GB"/>
           </a:p>
@@ -2091,7 +2529,7 @@
           <a:p>
             <a:fld id="{4A7CD4B7-1896-40FA-BCB1-23D61EC865BA}" type="datetimeFigureOut">
               <a:rPr lang="en-GB" smtClean="0"/>
-              <a:t>01/11/2021</a:t>
+              <a:t>02/11/2021</a:t>
             </a:fld>
             <a:endParaRPr lang="en-GB"/>
           </a:p>
@@ -2404,7 +2842,7 @@
           <a:p>
             <a:fld id="{4A7CD4B7-1896-40FA-BCB1-23D61EC865BA}" type="datetimeFigureOut">
               <a:rPr lang="en-GB" smtClean="0"/>
-              <a:t>01/11/2021</a:t>
+              <a:t>02/11/2021</a:t>
             </a:fld>
             <a:endParaRPr lang="en-GB"/>
           </a:p>
@@ -2693,7 +3131,7 @@
           <a:p>
             <a:fld id="{4A7CD4B7-1896-40FA-BCB1-23D61EC865BA}" type="datetimeFigureOut">
               <a:rPr lang="en-GB" smtClean="0"/>
-              <a:t>01/11/2021</a:t>
+              <a:t>02/11/2021</a:t>
             </a:fld>
             <a:endParaRPr lang="en-GB"/>
           </a:p>
@@ -2936,7 +3374,7 @@
           <a:p>
             <a:fld id="{4A7CD4B7-1896-40FA-BCB1-23D61EC865BA}" type="datetimeFigureOut">
               <a:rPr lang="en-GB" smtClean="0"/>
-              <a:t>01/11/2021</a:t>
+              <a:t>02/11/2021</a:t>
             </a:fld>
             <a:endParaRPr lang="en-GB"/>
           </a:p>
@@ -3498,7 +3936,7 @@
           <a:p>
             <a:r>
               <a:rPr lang="en-GB" dirty="0"/>
-              <a:t>The website has decent documentation and snippets of code but they lack comprehension</a:t>
+              <a:t>The website has decent documentation and snippets of code but they lack comprehensive examples/use cases</a:t>
             </a:r>
           </a:p>
           <a:p>
@@ -4800,6 +5238,544 @@
 <file path=ppt/slides/slide7.xml><?xml version="1.0" encoding="utf-8"?>
 <p:sld xmlns:a="http://schemas.openxmlformats.org/drawingml/2006/main" xmlns:r="http://schemas.openxmlformats.org/officeDocument/2006/relationships" xmlns:p="http://schemas.openxmlformats.org/presentationml/2006/main">
   <p:cSld>
+    <p:bg>
+      <p:bgPr>
+        <a:solidFill>
+          <a:schemeClr val="bg1"/>
+        </a:solidFill>
+        <a:effectLst/>
+      </p:bgPr>
+    </p:bg>
+    <p:spTree>
+      <p:nvGrpSpPr>
+        <p:cNvPr id="1" name=""/>
+        <p:cNvGrpSpPr/>
+        <p:nvPr/>
+      </p:nvGrpSpPr>
+      <p:grpSpPr>
+        <a:xfrm>
+          <a:off x="0" y="0"/>
+          <a:ext cx="0" cy="0"/>
+          <a:chOff x="0" y="0"/>
+          <a:chExt cx="0" cy="0"/>
+        </a:xfrm>
+      </p:grpSpPr>
+      <p:sp useBgFill="1">
+        <p:nvSpPr>
+          <p:cNvPr id="19" name="Rectangle 18">
+            <a:extLst>
+              <a:ext uri="{FF2B5EF4-FFF2-40B4-BE49-F238E27FC236}">
+                <a16:creationId xmlns:a16="http://schemas.microsoft.com/office/drawing/2014/main" id="{2B97F24A-32CE-4C1C-A50D-3016B394DCFB}"/>
+              </a:ext>
+              <a:ext uri="{C183D7F6-B498-43B3-948B-1728B52AA6E4}">
+                <adec:decorative xmlns:adec="http://schemas.microsoft.com/office/drawing/2017/decorative" val="1"/>
+              </a:ext>
+            </a:extLst>
+          </p:cNvPr>
+          <p:cNvSpPr>
+            <a:spLocks noGrp="1" noRot="1" noChangeAspect="1" noMove="1" noResize="1" noEditPoints="1" noAdjustHandles="1" noChangeArrowheads="1" noChangeShapeType="1" noTextEdit="1"/>
+          </p:cNvSpPr>
+          <p:nvPr>
+            <p:extLst>
+              <p:ext uri="{386F3935-93C4-4BCD-93E2-E3B085C9AB24}">
+                <p16:designElem xmlns:p16="http://schemas.microsoft.com/office/powerpoint/2015/main" val="1"/>
+              </p:ext>
+            </p:extLst>
+          </p:nvPr>
+        </p:nvSpPr>
+        <p:spPr>
+          <a:xfrm>
+            <a:off x="0" y="0"/>
+            <a:ext cx="12192000" cy="6858000"/>
+          </a:xfrm>
+          <a:prstGeom prst="rect">
+            <a:avLst/>
+          </a:prstGeom>
+          <a:ln>
+            <a:noFill/>
+          </a:ln>
+        </p:spPr>
+        <p:style>
+          <a:lnRef idx="2">
+            <a:schemeClr val="accent1">
+              <a:shade val="50000"/>
+            </a:schemeClr>
+          </a:lnRef>
+          <a:fillRef idx="1">
+            <a:schemeClr val="accent1"/>
+          </a:fillRef>
+          <a:effectRef idx="0">
+            <a:schemeClr val="accent1"/>
+          </a:effectRef>
+          <a:fontRef idx="minor">
+            <a:schemeClr val="lt1"/>
+          </a:fontRef>
+        </p:style>
+        <p:txBody>
+          <a:bodyPr rtlCol="0" anchor="ctr"/>
+          <a:lstStyle/>
+          <a:p>
+            <a:pPr algn="ctr"/>
+            <a:endParaRPr lang="en-US"/>
+          </a:p>
+        </p:txBody>
+      </p:sp>
+      <p:sp>
+        <p:nvSpPr>
+          <p:cNvPr id="2" name="Title 1">
+            <a:extLst>
+              <a:ext uri="{FF2B5EF4-FFF2-40B4-BE49-F238E27FC236}">
+                <a16:creationId xmlns:a16="http://schemas.microsoft.com/office/drawing/2014/main" id="{C22DD7BD-02FA-4DDD-A14F-D35A33D0369C}"/>
+              </a:ext>
+            </a:extLst>
+          </p:cNvPr>
+          <p:cNvSpPr>
+            <a:spLocks noGrp="1"/>
+          </p:cNvSpPr>
+          <p:nvPr>
+            <p:ph type="title"/>
+          </p:nvPr>
+        </p:nvSpPr>
+        <p:spPr>
+          <a:xfrm>
+            <a:off x="630936" y="639520"/>
+            <a:ext cx="3429000" cy="1719072"/>
+          </a:xfrm>
+        </p:spPr>
+        <p:txBody>
+          <a:bodyPr vert="horz" lIns="91440" tIns="45720" rIns="91440" bIns="45720" rtlCol="0" anchor="b">
+            <a:normAutofit/>
+          </a:bodyPr>
+          <a:lstStyle/>
+          <a:p>
+            <a:r>
+              <a:rPr lang="en-US" sz="3400" kern="1200" dirty="0">
+                <a:latin typeface="+mj-lt"/>
+                <a:ea typeface="+mj-ea"/>
+                <a:cs typeface="+mj-cs"/>
+              </a:rPr>
+              <a:t>Request and Reply</a:t>
+            </a:r>
+          </a:p>
+        </p:txBody>
+      </p:sp>
+      <p:sp>
+        <p:nvSpPr>
+          <p:cNvPr id="21" name="sketch line">
+            <a:extLst>
+              <a:ext uri="{FF2B5EF4-FFF2-40B4-BE49-F238E27FC236}">
+                <a16:creationId xmlns:a16="http://schemas.microsoft.com/office/drawing/2014/main" id="{6357EC4F-235E-4222-A36F-C7878ACE37F2}"/>
+              </a:ext>
+              <a:ext uri="{C183D7F6-B498-43B3-948B-1728B52AA6E4}">
+                <adec:decorative xmlns:adec="http://schemas.microsoft.com/office/drawing/2017/decorative" val="1"/>
+              </a:ext>
+            </a:extLst>
+          </p:cNvPr>
+          <p:cNvSpPr>
+            <a:spLocks noGrp="1" noRot="1" noChangeAspect="1" noMove="1" noResize="1" noEditPoints="1" noAdjustHandles="1" noChangeArrowheads="1" noChangeShapeType="1" noTextEdit="1"/>
+          </p:cNvSpPr>
+          <p:nvPr>
+            <p:extLst>
+              <p:ext uri="{386F3935-93C4-4BCD-93E2-E3B085C9AB24}">
+                <p16:designElem xmlns:p16="http://schemas.microsoft.com/office/powerpoint/2015/main" val="1"/>
+              </p:ext>
+            </p:extLst>
+          </p:nvPr>
+        </p:nvSpPr>
+        <p:spPr>
+          <a:xfrm>
+            <a:off x="643278" y="2573756"/>
+            <a:ext cx="3255095" cy="18288"/>
+          </a:xfrm>
+          <a:custGeom>
+            <a:avLst/>
+            <a:gdLst>
+              <a:gd name="connsiteX0" fmla="*/ 0 w 3255095"/>
+              <a:gd name="connsiteY0" fmla="*/ 0 h 18288"/>
+              <a:gd name="connsiteX1" fmla="*/ 618468 w 3255095"/>
+              <a:gd name="connsiteY1" fmla="*/ 0 h 18288"/>
+              <a:gd name="connsiteX2" fmla="*/ 1269487 w 3255095"/>
+              <a:gd name="connsiteY2" fmla="*/ 0 h 18288"/>
+              <a:gd name="connsiteX3" fmla="*/ 1953057 w 3255095"/>
+              <a:gd name="connsiteY3" fmla="*/ 0 h 18288"/>
+              <a:gd name="connsiteX4" fmla="*/ 2636627 w 3255095"/>
+              <a:gd name="connsiteY4" fmla="*/ 0 h 18288"/>
+              <a:gd name="connsiteX5" fmla="*/ 3255095 w 3255095"/>
+              <a:gd name="connsiteY5" fmla="*/ 0 h 18288"/>
+              <a:gd name="connsiteX6" fmla="*/ 3255095 w 3255095"/>
+              <a:gd name="connsiteY6" fmla="*/ 18288 h 18288"/>
+              <a:gd name="connsiteX7" fmla="*/ 2538974 w 3255095"/>
+              <a:gd name="connsiteY7" fmla="*/ 18288 h 18288"/>
+              <a:gd name="connsiteX8" fmla="*/ 1822853 w 3255095"/>
+              <a:gd name="connsiteY8" fmla="*/ 18288 h 18288"/>
+              <a:gd name="connsiteX9" fmla="*/ 1171834 w 3255095"/>
+              <a:gd name="connsiteY9" fmla="*/ 18288 h 18288"/>
+              <a:gd name="connsiteX10" fmla="*/ 0 w 3255095"/>
+              <a:gd name="connsiteY10" fmla="*/ 18288 h 18288"/>
+              <a:gd name="connsiteX11" fmla="*/ 0 w 3255095"/>
+              <a:gd name="connsiteY11" fmla="*/ 0 h 18288"/>
+            </a:gdLst>
+            <a:ahLst/>
+            <a:cxnLst>
+              <a:cxn ang="0">
+                <a:pos x="connsiteX0" y="connsiteY0"/>
+              </a:cxn>
+              <a:cxn ang="0">
+                <a:pos x="connsiteX1" y="connsiteY1"/>
+              </a:cxn>
+              <a:cxn ang="0">
+                <a:pos x="connsiteX2" y="connsiteY2"/>
+              </a:cxn>
+              <a:cxn ang="0">
+                <a:pos x="connsiteX3" y="connsiteY3"/>
+              </a:cxn>
+              <a:cxn ang="0">
+                <a:pos x="connsiteX4" y="connsiteY4"/>
+              </a:cxn>
+              <a:cxn ang="0">
+                <a:pos x="connsiteX5" y="connsiteY5"/>
+              </a:cxn>
+              <a:cxn ang="0">
+                <a:pos x="connsiteX6" y="connsiteY6"/>
+              </a:cxn>
+              <a:cxn ang="0">
+                <a:pos x="connsiteX7" y="connsiteY7"/>
+              </a:cxn>
+              <a:cxn ang="0">
+                <a:pos x="connsiteX8" y="connsiteY8"/>
+              </a:cxn>
+              <a:cxn ang="0">
+                <a:pos x="connsiteX9" y="connsiteY9"/>
+              </a:cxn>
+              <a:cxn ang="0">
+                <a:pos x="connsiteX10" y="connsiteY10"/>
+              </a:cxn>
+              <a:cxn ang="0">
+                <a:pos x="connsiteX11" y="connsiteY11"/>
+              </a:cxn>
+            </a:cxnLst>
+            <a:rect l="l" t="t" r="r" b="b"/>
+            <a:pathLst>
+              <a:path w="3255095" h="18288" fill="none" extrusionOk="0">
+                <a:moveTo>
+                  <a:pt x="0" y="0"/>
+                </a:moveTo>
+                <a:cubicBezTo>
+                  <a:pt x="240201" y="-22123"/>
+                  <a:pt x="462021" y="-19623"/>
+                  <a:pt x="618468" y="0"/>
+                </a:cubicBezTo>
+                <a:cubicBezTo>
+                  <a:pt x="774915" y="19623"/>
+                  <a:pt x="974734" y="2035"/>
+                  <a:pt x="1269487" y="0"/>
+                </a:cubicBezTo>
+                <a:cubicBezTo>
+                  <a:pt x="1564240" y="-2035"/>
+                  <a:pt x="1733579" y="10639"/>
+                  <a:pt x="1953057" y="0"/>
+                </a:cubicBezTo>
+                <a:cubicBezTo>
+                  <a:pt x="2172535" y="-10639"/>
+                  <a:pt x="2453962" y="14018"/>
+                  <a:pt x="2636627" y="0"/>
+                </a:cubicBezTo>
+                <a:cubicBezTo>
+                  <a:pt x="2819292" y="-14018"/>
+                  <a:pt x="3121375" y="5399"/>
+                  <a:pt x="3255095" y="0"/>
+                </a:cubicBezTo>
+                <a:cubicBezTo>
+                  <a:pt x="3254386" y="8157"/>
+                  <a:pt x="3254682" y="12125"/>
+                  <a:pt x="3255095" y="18288"/>
+                </a:cubicBezTo>
+                <a:cubicBezTo>
+                  <a:pt x="3088545" y="23203"/>
+                  <a:pt x="2687475" y="7419"/>
+                  <a:pt x="2538974" y="18288"/>
+                </a:cubicBezTo>
+                <a:cubicBezTo>
+                  <a:pt x="2390473" y="29157"/>
+                  <a:pt x="2137381" y="-8959"/>
+                  <a:pt x="1822853" y="18288"/>
+                </a:cubicBezTo>
+                <a:cubicBezTo>
+                  <a:pt x="1508325" y="45535"/>
+                  <a:pt x="1466437" y="20385"/>
+                  <a:pt x="1171834" y="18288"/>
+                </a:cubicBezTo>
+                <a:cubicBezTo>
+                  <a:pt x="877231" y="16191"/>
+                  <a:pt x="561097" y="37643"/>
+                  <a:pt x="0" y="18288"/>
+                </a:cubicBezTo>
+                <a:cubicBezTo>
+                  <a:pt x="-46" y="12483"/>
+                  <a:pt x="-203" y="6491"/>
+                  <a:pt x="0" y="0"/>
+                </a:cubicBezTo>
+                <a:close/>
+              </a:path>
+              <a:path w="3255095" h="18288" stroke="0" extrusionOk="0">
+                <a:moveTo>
+                  <a:pt x="0" y="0"/>
+                </a:moveTo>
+                <a:cubicBezTo>
+                  <a:pt x="291965" y="19429"/>
+                  <a:pt x="363155" y="8568"/>
+                  <a:pt x="618468" y="0"/>
+                </a:cubicBezTo>
+                <a:cubicBezTo>
+                  <a:pt x="873781" y="-8568"/>
+                  <a:pt x="904459" y="-19505"/>
+                  <a:pt x="1171834" y="0"/>
+                </a:cubicBezTo>
+                <a:cubicBezTo>
+                  <a:pt x="1439209" y="19505"/>
+                  <a:pt x="1744369" y="9790"/>
+                  <a:pt x="1887955" y="0"/>
+                </a:cubicBezTo>
+                <a:cubicBezTo>
+                  <a:pt x="2031541" y="-9790"/>
+                  <a:pt x="2346378" y="21240"/>
+                  <a:pt x="2506423" y="0"/>
+                </a:cubicBezTo>
+                <a:cubicBezTo>
+                  <a:pt x="2666468" y="-21240"/>
+                  <a:pt x="2990257" y="30414"/>
+                  <a:pt x="3255095" y="0"/>
+                </a:cubicBezTo>
+                <a:cubicBezTo>
+                  <a:pt x="3254831" y="4493"/>
+                  <a:pt x="3255479" y="9472"/>
+                  <a:pt x="3255095" y="18288"/>
+                </a:cubicBezTo>
+                <a:cubicBezTo>
+                  <a:pt x="3120743" y="16690"/>
+                  <a:pt x="2759628" y="42462"/>
+                  <a:pt x="2604076" y="18288"/>
+                </a:cubicBezTo>
+                <a:cubicBezTo>
+                  <a:pt x="2448524" y="-5886"/>
+                  <a:pt x="2184336" y="19599"/>
+                  <a:pt x="1887955" y="18288"/>
+                </a:cubicBezTo>
+                <a:cubicBezTo>
+                  <a:pt x="1591574" y="16977"/>
+                  <a:pt x="1548845" y="6870"/>
+                  <a:pt x="1334589" y="18288"/>
+                </a:cubicBezTo>
+                <a:cubicBezTo>
+                  <a:pt x="1120333" y="29706"/>
+                  <a:pt x="996014" y="9662"/>
+                  <a:pt x="683570" y="18288"/>
+                </a:cubicBezTo>
+                <a:cubicBezTo>
+                  <a:pt x="371126" y="26914"/>
+                  <a:pt x="198687" y="16167"/>
+                  <a:pt x="0" y="18288"/>
+                </a:cubicBezTo>
+                <a:cubicBezTo>
+                  <a:pt x="843" y="9577"/>
+                  <a:pt x="371" y="6900"/>
+                  <a:pt x="0" y="0"/>
+                </a:cubicBezTo>
+                <a:close/>
+              </a:path>
+            </a:pathLst>
+          </a:custGeom>
+          <a:solidFill>
+            <a:schemeClr val="accent2"/>
+          </a:solidFill>
+          <a:ln w="38100" cap="rnd">
+            <a:solidFill>
+              <a:schemeClr val="accent2"/>
+            </a:solidFill>
+            <a:round/>
+            <a:extLst>
+              <a:ext uri="{C807C97D-BFC1-408E-A445-0C87EB9F89A2}">
+                <ask:lineSketchStyleProps xmlns:ask="http://schemas.microsoft.com/office/drawing/2018/sketchyshapes" sd="1219033472">
+                  <a:prstGeom prst="rect">
+                    <a:avLst/>
+                  </a:prstGeom>
+                  <ask:type>
+                    <ask:lineSketchFreehand/>
+                  </ask:type>
+                </ask:lineSketchStyleProps>
+              </a:ext>
+            </a:extLst>
+          </a:ln>
+        </p:spPr>
+        <p:style>
+          <a:lnRef idx="2">
+            <a:schemeClr val="accent1">
+              <a:shade val="50000"/>
+            </a:schemeClr>
+          </a:lnRef>
+          <a:fillRef idx="1">
+            <a:schemeClr val="accent1"/>
+          </a:fillRef>
+          <a:effectRef idx="0">
+            <a:schemeClr val="accent1"/>
+          </a:effectRef>
+          <a:fontRef idx="minor">
+            <a:schemeClr val="lt1"/>
+          </a:fontRef>
+        </p:style>
+        <p:txBody>
+          <a:bodyPr rtlCol="0" anchor="ctr"/>
+          <a:lstStyle/>
+          <a:p>
+            <a:pPr algn="ctr"/>
+            <a:endParaRPr lang="en-US"/>
+          </a:p>
+        </p:txBody>
+      </p:sp>
+      <p:sp>
+        <p:nvSpPr>
+          <p:cNvPr id="16" name="Content Placeholder 15">
+            <a:extLst>
+              <a:ext uri="{FF2B5EF4-FFF2-40B4-BE49-F238E27FC236}">
+                <a16:creationId xmlns:a16="http://schemas.microsoft.com/office/drawing/2014/main" id="{C6EF9DF9-304C-4B0E-B284-5D4CE0A2DAD1}"/>
+              </a:ext>
+            </a:extLst>
+          </p:cNvPr>
+          <p:cNvSpPr>
+            <a:spLocks noGrp="1"/>
+          </p:cNvSpPr>
+          <p:nvPr>
+            <p:ph idx="1"/>
+          </p:nvPr>
+        </p:nvSpPr>
+        <p:spPr>
+          <a:xfrm>
+            <a:off x="630936" y="2807208"/>
+            <a:ext cx="3429000" cy="3410712"/>
+          </a:xfrm>
+        </p:spPr>
+        <p:txBody>
+          <a:bodyPr anchor="t">
+            <a:normAutofit/>
+          </a:bodyPr>
+          <a:lstStyle/>
+          <a:p>
+            <a:r>
+              <a:rPr lang="en-US" sz="2400" kern="1200" dirty="0">
+                <a:latin typeface="+mj-lt"/>
+                <a:ea typeface="+mj-ea"/>
+                <a:cs typeface="+mj-cs"/>
+              </a:rPr>
+              <a:t>Messaging Pattern</a:t>
+            </a:r>
+          </a:p>
+          <a:p>
+            <a:r>
+              <a:rPr lang="en-US" sz="2400" dirty="0">
+                <a:latin typeface="+mj-lt"/>
+                <a:ea typeface="+mj-ea"/>
+                <a:cs typeface="+mj-cs"/>
+              </a:rPr>
+              <a:t>Really good for decentralized applications</a:t>
+            </a:r>
+            <a:endParaRPr lang="en-US" sz="2200" dirty="0"/>
+          </a:p>
+        </p:txBody>
+      </p:sp>
+      <p:pic>
+        <p:nvPicPr>
+          <p:cNvPr id="5" name="Content Placeholder 4" descr="Diagram&#10;&#10;Description automatically generated">
+            <a:extLst>
+              <a:ext uri="{FF2B5EF4-FFF2-40B4-BE49-F238E27FC236}">
+                <a16:creationId xmlns:a16="http://schemas.microsoft.com/office/drawing/2014/main" id="{D9D7105C-E856-4741-8D40-119E04EDC551}"/>
+              </a:ext>
+            </a:extLst>
+          </p:cNvPr>
+          <p:cNvPicPr>
+            <a:picLocks noChangeAspect="1"/>
+          </p:cNvPicPr>
+          <p:nvPr/>
+        </p:nvPicPr>
+        <p:blipFill>
+          <a:blip r:embed="rId3">
+            <a:extLst>
+              <a:ext uri="{28A0092B-C50C-407E-A947-70E740481C1C}">
+                <a14:useLocalDpi xmlns:a14="http://schemas.microsoft.com/office/drawing/2010/main" val="0"/>
+              </a:ext>
+            </a:extLst>
+          </a:blip>
+          <a:stretch>
+            <a:fillRect/>
+          </a:stretch>
+        </p:blipFill>
+        <p:spPr>
+          <a:xfrm>
+            <a:off x="4654296" y="1763477"/>
+            <a:ext cx="6903720" cy="3331045"/>
+          </a:xfrm>
+          <a:prstGeom prst="rect">
+            <a:avLst/>
+          </a:prstGeom>
+        </p:spPr>
+      </p:pic>
+      <p:sp>
+        <p:nvSpPr>
+          <p:cNvPr id="6" name="TextBox 5">
+            <a:extLst>
+              <a:ext uri="{FF2B5EF4-FFF2-40B4-BE49-F238E27FC236}">
+                <a16:creationId xmlns:a16="http://schemas.microsoft.com/office/drawing/2014/main" id="{C00564E9-BA6F-4303-86B5-681F3D86218B}"/>
+              </a:ext>
+            </a:extLst>
+          </p:cNvPr>
+          <p:cNvSpPr txBox="1"/>
+          <p:nvPr/>
+        </p:nvSpPr>
+        <p:spPr>
+          <a:xfrm>
+            <a:off x="8273143" y="6217920"/>
+            <a:ext cx="3918857" cy="369332"/>
+          </a:xfrm>
+          <a:prstGeom prst="rect">
+            <a:avLst/>
+          </a:prstGeom>
+          <a:noFill/>
+        </p:spPr>
+        <p:txBody>
+          <a:bodyPr wrap="square" rtlCol="0">
+            <a:spAutoFit/>
+          </a:bodyPr>
+          <a:lstStyle/>
+          <a:p>
+            <a:r>
+              <a:rPr lang="en-GB" dirty="0"/>
+              <a:t>Source: </a:t>
+            </a:r>
+            <a:r>
+              <a:rPr lang="en-GB" dirty="0">
+                <a:hlinkClick r:id="rId4"/>
+              </a:rPr>
+              <a:t>Enterprise Integration Patterns</a:t>
+            </a:r>
+            <a:endParaRPr lang="en-GB" dirty="0"/>
+          </a:p>
+        </p:txBody>
+      </p:sp>
+    </p:spTree>
+    <p:extLst>
+      <p:ext uri="{BB962C8B-B14F-4D97-AF65-F5344CB8AC3E}">
+        <p14:creationId xmlns:p14="http://schemas.microsoft.com/office/powerpoint/2010/main" val="1163713778"/>
+      </p:ext>
+    </p:extLst>
+  </p:cSld>
+  <p:clrMapOvr>
+    <a:masterClrMapping/>
+  </p:clrMapOvr>
+</p:sld>
+</file>
+
+<file path=ppt/slides/slide8.xml><?xml version="1.0" encoding="utf-8"?>
+<p:sld xmlns:a="http://schemas.openxmlformats.org/drawingml/2006/main" xmlns:r="http://schemas.openxmlformats.org/officeDocument/2006/relationships" xmlns:p="http://schemas.openxmlformats.org/presentationml/2006/main">
+  <p:cSld>
     <p:spTree>
       <p:nvGrpSpPr>
         <p:cNvPr id="1" name=""/>
@@ -5230,4 +6206,299 @@
     </a:ext>
   </a:extLst>
 </a:theme>
+</file>
+
+<file path=ppt/theme/theme2.xml><?xml version="1.0" encoding="utf-8"?>
+<a:theme xmlns:a="http://schemas.openxmlformats.org/drawingml/2006/main" name="Office Theme">
+  <a:themeElements>
+    <a:clrScheme name="Office">
+      <a:dk1>
+        <a:sysClr val="windowText" lastClr="000000"/>
+      </a:dk1>
+      <a:lt1>
+        <a:sysClr val="window" lastClr="FFFFFF"/>
+      </a:lt1>
+      <a:dk2>
+        <a:srgbClr val="44546A"/>
+      </a:dk2>
+      <a:lt2>
+        <a:srgbClr val="E7E6E6"/>
+      </a:lt2>
+      <a:accent1>
+        <a:srgbClr val="4472C4"/>
+      </a:accent1>
+      <a:accent2>
+        <a:srgbClr val="ED7D31"/>
+      </a:accent2>
+      <a:accent3>
+        <a:srgbClr val="A5A5A5"/>
+      </a:accent3>
+      <a:accent4>
+        <a:srgbClr val="FFC000"/>
+      </a:accent4>
+      <a:accent5>
+        <a:srgbClr val="5B9BD5"/>
+      </a:accent5>
+      <a:accent6>
+        <a:srgbClr val="70AD47"/>
+      </a:accent6>
+      <a:hlink>
+        <a:srgbClr val="0563C1"/>
+      </a:hlink>
+      <a:folHlink>
+        <a:srgbClr val="954F72"/>
+      </a:folHlink>
+    </a:clrScheme>
+    <a:fontScheme name="Office">
+      <a:majorFont>
+        <a:latin typeface="Calibri Light" panose="020F0302020204030204"/>
+        <a:ea typeface=""/>
+        <a:cs typeface=""/>
+        <a:font script="Jpan" typeface="游ゴシック Light"/>
+        <a:font script="Hang" typeface="맑은 고딕"/>
+        <a:font script="Hans" typeface="等线 Light"/>
+        <a:font script="Hant" typeface="新細明體"/>
+        <a:font script="Arab" typeface="Times New Roman"/>
+        <a:font script="Hebr" typeface="Times New Roman"/>
+        <a:font script="Thai" typeface="Angsana New"/>
+        <a:font script="Ethi" typeface="Nyala"/>
+        <a:font script="Beng" typeface="Vrinda"/>
+        <a:font script="Gujr" typeface="Shruti"/>
+        <a:font script="Khmr" typeface="MoolBoran"/>
+        <a:font script="Knda" typeface="Tunga"/>
+        <a:font script="Guru" typeface="Raavi"/>
+        <a:font script="Cans" typeface="Euphemia"/>
+        <a:font script="Cher" typeface="Plantagenet Cherokee"/>
+        <a:font script="Yiii" typeface="Microsoft Yi Baiti"/>
+        <a:font script="Tibt" typeface="Microsoft Himalaya"/>
+        <a:font script="Thaa" typeface="MV Boli"/>
+        <a:font script="Deva" typeface="Mangal"/>
+        <a:font script="Telu" typeface="Gautami"/>
+        <a:font script="Taml" typeface="Latha"/>
+        <a:font script="Syrc" typeface="Estrangelo Edessa"/>
+        <a:font script="Orya" typeface="Kalinga"/>
+        <a:font script="Mlym" typeface="Kartika"/>
+        <a:font script="Laoo" typeface="DokChampa"/>
+        <a:font script="Sinh" typeface="Iskoola Pota"/>
+        <a:font script="Mong" typeface="Mongolian Baiti"/>
+        <a:font script="Viet" typeface="Times New Roman"/>
+        <a:font script="Uigh" typeface="Microsoft Uighur"/>
+        <a:font script="Geor" typeface="Sylfaen"/>
+        <a:font script="Armn" typeface="Arial"/>
+        <a:font script="Bugi" typeface="Leelawadee UI"/>
+        <a:font script="Bopo" typeface="Microsoft JhengHei"/>
+        <a:font script="Java" typeface="Javanese Text"/>
+        <a:font script="Lisu" typeface="Segoe UI"/>
+        <a:font script="Mymr" typeface="Myanmar Text"/>
+        <a:font script="Nkoo" typeface="Ebrima"/>
+        <a:font script="Olck" typeface="Nirmala UI"/>
+        <a:font script="Osma" typeface="Ebrima"/>
+        <a:font script="Phag" typeface="Phagspa"/>
+        <a:font script="Syrn" typeface="Estrangelo Edessa"/>
+        <a:font script="Syrj" typeface="Estrangelo Edessa"/>
+        <a:font script="Syre" typeface="Estrangelo Edessa"/>
+        <a:font script="Sora" typeface="Nirmala UI"/>
+        <a:font script="Tale" typeface="Microsoft Tai Le"/>
+        <a:font script="Talu" typeface="Microsoft New Tai Lue"/>
+        <a:font script="Tfng" typeface="Ebrima"/>
+      </a:majorFont>
+      <a:minorFont>
+        <a:latin typeface="Calibri" panose="020F0502020204030204"/>
+        <a:ea typeface=""/>
+        <a:cs typeface=""/>
+        <a:font script="Jpan" typeface="游ゴシック"/>
+        <a:font script="Hang" typeface="맑은 고딕"/>
+        <a:font script="Hans" typeface="等线"/>
+        <a:font script="Hant" typeface="新細明體"/>
+        <a:font script="Arab" typeface="Arial"/>
+        <a:font script="Hebr" typeface="Arial"/>
+        <a:font script="Thai" typeface="Cordia New"/>
+        <a:font script="Ethi" typeface="Nyala"/>
+        <a:font script="Beng" typeface="Vrinda"/>
+        <a:font script="Gujr" typeface="Shruti"/>
+        <a:font script="Khmr" typeface="DaunPenh"/>
+        <a:font script="Knda" typeface="Tunga"/>
+        <a:font script="Guru" typeface="Raavi"/>
+        <a:font script="Cans" typeface="Euphemia"/>
+        <a:font script="Cher" typeface="Plantagenet Cherokee"/>
+        <a:font script="Yiii" typeface="Microsoft Yi Baiti"/>
+        <a:font script="Tibt" typeface="Microsoft Himalaya"/>
+        <a:font script="Thaa" typeface="MV Boli"/>
+        <a:font script="Deva" typeface="Mangal"/>
+        <a:font script="Telu" typeface="Gautami"/>
+        <a:font script="Taml" typeface="Latha"/>
+        <a:font script="Syrc" typeface="Estrangelo Edessa"/>
+        <a:font script="Orya" typeface="Kalinga"/>
+        <a:font script="Mlym" typeface="Kartika"/>
+        <a:font script="Laoo" typeface="DokChampa"/>
+        <a:font script="Sinh" typeface="Iskoola Pota"/>
+        <a:font script="Mong" typeface="Mongolian Baiti"/>
+        <a:font script="Viet" typeface="Arial"/>
+        <a:font script="Uigh" typeface="Microsoft Uighur"/>
+        <a:font script="Geor" typeface="Sylfaen"/>
+        <a:font script="Armn" typeface="Arial"/>
+        <a:font script="Bugi" typeface="Leelawadee UI"/>
+        <a:font script="Bopo" typeface="Microsoft JhengHei"/>
+        <a:font script="Java" typeface="Javanese Text"/>
+        <a:font script="Lisu" typeface="Segoe UI"/>
+        <a:font script="Mymr" typeface="Myanmar Text"/>
+        <a:font script="Nkoo" typeface="Ebrima"/>
+        <a:font script="Olck" typeface="Nirmala UI"/>
+        <a:font script="Osma" typeface="Ebrima"/>
+        <a:font script="Phag" typeface="Phagspa"/>
+        <a:font script="Syrn" typeface="Estrangelo Edessa"/>
+        <a:font script="Syrj" typeface="Estrangelo Edessa"/>
+        <a:font script="Syre" typeface="Estrangelo Edessa"/>
+        <a:font script="Sora" typeface="Nirmala UI"/>
+        <a:font script="Tale" typeface="Microsoft Tai Le"/>
+        <a:font script="Talu" typeface="Microsoft New Tai Lue"/>
+        <a:font script="Tfng" typeface="Ebrima"/>
+      </a:minorFont>
+    </a:fontScheme>
+    <a:fmtScheme name="Office">
+      <a:fillStyleLst>
+        <a:solidFill>
+          <a:schemeClr val="phClr"/>
+        </a:solidFill>
+        <a:gradFill rotWithShape="1">
+          <a:gsLst>
+            <a:gs pos="0">
+              <a:schemeClr val="phClr">
+                <a:lumMod val="110000"/>
+                <a:satMod val="105000"/>
+                <a:tint val="67000"/>
+              </a:schemeClr>
+            </a:gs>
+            <a:gs pos="50000">
+              <a:schemeClr val="phClr">
+                <a:lumMod val="105000"/>
+                <a:satMod val="103000"/>
+                <a:tint val="73000"/>
+              </a:schemeClr>
+            </a:gs>
+            <a:gs pos="100000">
+              <a:schemeClr val="phClr">
+                <a:lumMod val="105000"/>
+                <a:satMod val="109000"/>
+                <a:tint val="81000"/>
+              </a:schemeClr>
+            </a:gs>
+          </a:gsLst>
+          <a:lin ang="5400000" scaled="0"/>
+        </a:gradFill>
+        <a:gradFill rotWithShape="1">
+          <a:gsLst>
+            <a:gs pos="0">
+              <a:schemeClr val="phClr">
+                <a:satMod val="103000"/>
+                <a:lumMod val="102000"/>
+                <a:tint val="94000"/>
+              </a:schemeClr>
+            </a:gs>
+            <a:gs pos="50000">
+              <a:schemeClr val="phClr">
+                <a:satMod val="110000"/>
+                <a:lumMod val="100000"/>
+                <a:shade val="100000"/>
+              </a:schemeClr>
+            </a:gs>
+            <a:gs pos="100000">
+              <a:schemeClr val="phClr">
+                <a:lumMod val="99000"/>
+                <a:satMod val="120000"/>
+                <a:shade val="78000"/>
+              </a:schemeClr>
+            </a:gs>
+          </a:gsLst>
+          <a:lin ang="5400000" scaled="0"/>
+        </a:gradFill>
+      </a:fillStyleLst>
+      <a:lnStyleLst>
+        <a:ln w="6350" cap="flat" cmpd="sng" algn="ctr">
+          <a:solidFill>
+            <a:schemeClr val="phClr"/>
+          </a:solidFill>
+          <a:prstDash val="solid"/>
+          <a:miter lim="800000"/>
+        </a:ln>
+        <a:ln w="12700" cap="flat" cmpd="sng" algn="ctr">
+          <a:solidFill>
+            <a:schemeClr val="phClr"/>
+          </a:solidFill>
+          <a:prstDash val="solid"/>
+          <a:miter lim="800000"/>
+        </a:ln>
+        <a:ln w="19050" cap="flat" cmpd="sng" algn="ctr">
+          <a:solidFill>
+            <a:schemeClr val="phClr"/>
+          </a:solidFill>
+          <a:prstDash val="solid"/>
+          <a:miter lim="800000"/>
+        </a:ln>
+      </a:lnStyleLst>
+      <a:effectStyleLst>
+        <a:effectStyle>
+          <a:effectLst/>
+        </a:effectStyle>
+        <a:effectStyle>
+          <a:effectLst/>
+        </a:effectStyle>
+        <a:effectStyle>
+          <a:effectLst>
+            <a:outerShdw blurRad="57150" dist="19050" dir="5400000" algn="ctr" rotWithShape="0">
+              <a:srgbClr val="000000">
+                <a:alpha val="63000"/>
+              </a:srgbClr>
+            </a:outerShdw>
+          </a:effectLst>
+        </a:effectStyle>
+      </a:effectStyleLst>
+      <a:bgFillStyleLst>
+        <a:solidFill>
+          <a:schemeClr val="phClr"/>
+        </a:solidFill>
+        <a:solidFill>
+          <a:schemeClr val="phClr">
+            <a:tint val="95000"/>
+            <a:satMod val="170000"/>
+          </a:schemeClr>
+        </a:solidFill>
+        <a:gradFill rotWithShape="1">
+          <a:gsLst>
+            <a:gs pos="0">
+              <a:schemeClr val="phClr">
+                <a:tint val="93000"/>
+                <a:satMod val="150000"/>
+                <a:shade val="98000"/>
+                <a:lumMod val="102000"/>
+              </a:schemeClr>
+            </a:gs>
+            <a:gs pos="50000">
+              <a:schemeClr val="phClr">
+                <a:tint val="98000"/>
+                <a:satMod val="130000"/>
+                <a:shade val="90000"/>
+                <a:lumMod val="103000"/>
+              </a:schemeClr>
+            </a:gs>
+            <a:gs pos="100000">
+              <a:schemeClr val="phClr">
+                <a:shade val="63000"/>
+                <a:satMod val="120000"/>
+              </a:schemeClr>
+            </a:gs>
+          </a:gsLst>
+          <a:lin ang="5400000" scaled="0"/>
+        </a:gradFill>
+      </a:bgFillStyleLst>
+    </a:fmtScheme>
+  </a:themeElements>
+  <a:objectDefaults/>
+  <a:extraClrSchemeLst/>
+  <a:extLst>
+    <a:ext uri="{05A4C25C-085E-4340-85A3-A5531E510DB2}">
+      <thm15:themeFamily xmlns:thm15="http://schemas.microsoft.com/office/thememl/2012/main" name="Office Theme" id="{62F939B6-93AF-4DB8-9C6B-D6C7DFDC589F}" vid="{4A3C46E8-61CC-4603-A589-7422A47A8E4A}"/>
+    </a:ext>
+  </a:extLst>
+</a:theme>
 </file>
</xml_diff>

<commit_message>
Improve presentation and apps
</commit_message>
<xml_diff>
--- a/Diagrams/presentation.pptx
+++ b/Diagrams/presentation.pptx
@@ -5,17 +5,19 @@
     <p:sldMasterId id="2147483648" r:id="rId1"/>
   </p:sldMasterIdLst>
   <p:notesMasterIdLst>
-    <p:notesMasterId r:id="rId10"/>
+    <p:notesMasterId r:id="rId12"/>
   </p:notesMasterIdLst>
   <p:sldIdLst>
     <p:sldId id="256" r:id="rId2"/>
     <p:sldId id="261" r:id="rId3"/>
     <p:sldId id="258" r:id="rId4"/>
     <p:sldId id="257" r:id="rId5"/>
-    <p:sldId id="259" r:id="rId6"/>
-    <p:sldId id="262" r:id="rId7"/>
-    <p:sldId id="263" r:id="rId8"/>
-    <p:sldId id="260" r:id="rId9"/>
+    <p:sldId id="264" r:id="rId6"/>
+    <p:sldId id="259" r:id="rId7"/>
+    <p:sldId id="265" r:id="rId8"/>
+    <p:sldId id="262" r:id="rId9"/>
+    <p:sldId id="263" r:id="rId10"/>
+    <p:sldId id="260" r:id="rId11"/>
   </p:sldIdLst>
   <p:sldSz cx="12192000" cy="6858000"/>
   <p:notesSz cx="6858000" cy="9144000"/>
@@ -537,7 +539,7 @@
           <a:p>
             <a:fld id="{9CD0AFCF-035F-44D7-A598-3B17142E29A2}" type="slidenum">
               <a:rPr lang="en-GB" smtClean="0"/>
-              <a:t>7</a:t>
+              <a:t>9</a:t>
             </a:fld>
             <a:endParaRPr lang="en-GB"/>
           </a:p>
@@ -3845,6 +3847,146 @@
     <p:extLst>
       <p:ext uri="{BB962C8B-B14F-4D97-AF65-F5344CB8AC3E}">
         <p14:creationId xmlns:p14="http://schemas.microsoft.com/office/powerpoint/2010/main" val="2195184523"/>
+      </p:ext>
+    </p:extLst>
+  </p:cSld>
+  <p:clrMapOvr>
+    <a:masterClrMapping/>
+  </p:clrMapOvr>
+</p:sld>
+</file>
+
+<file path=ppt/slides/slide10.xml><?xml version="1.0" encoding="utf-8"?>
+<p:sld xmlns:a="http://schemas.openxmlformats.org/drawingml/2006/main" xmlns:r="http://schemas.openxmlformats.org/officeDocument/2006/relationships" xmlns:p="http://schemas.openxmlformats.org/presentationml/2006/main">
+  <p:cSld>
+    <p:spTree>
+      <p:nvGrpSpPr>
+        <p:cNvPr id="1" name=""/>
+        <p:cNvGrpSpPr/>
+        <p:nvPr/>
+      </p:nvGrpSpPr>
+      <p:grpSpPr>
+        <a:xfrm>
+          <a:off x="0" y="0"/>
+          <a:ext cx="0" cy="0"/>
+          <a:chOff x="0" y="0"/>
+          <a:chExt cx="0" cy="0"/>
+        </a:xfrm>
+      </p:grpSpPr>
+      <p:sp>
+        <p:nvSpPr>
+          <p:cNvPr id="2" name="Title 1">
+            <a:extLst>
+              <a:ext uri="{FF2B5EF4-FFF2-40B4-BE49-F238E27FC236}">
+                <a16:creationId xmlns:a16="http://schemas.microsoft.com/office/drawing/2014/main" id="{7905FCBB-5F96-4436-B97D-E0449C7FEF0D}"/>
+              </a:ext>
+            </a:extLst>
+          </p:cNvPr>
+          <p:cNvSpPr>
+            <a:spLocks noGrp="1"/>
+          </p:cNvSpPr>
+          <p:nvPr>
+            <p:ph type="title"/>
+          </p:nvPr>
+        </p:nvSpPr>
+        <p:spPr/>
+        <p:txBody>
+          <a:bodyPr/>
+          <a:lstStyle/>
+          <a:p>
+            <a:r>
+              <a:rPr lang="en-GB" dirty="0"/>
+              <a:t>Future of ActiveMQ</a:t>
+            </a:r>
+          </a:p>
+        </p:txBody>
+      </p:sp>
+      <p:sp>
+        <p:nvSpPr>
+          <p:cNvPr id="3" name="Content Placeholder 2">
+            <a:extLst>
+              <a:ext uri="{FF2B5EF4-FFF2-40B4-BE49-F238E27FC236}">
+                <a16:creationId xmlns:a16="http://schemas.microsoft.com/office/drawing/2014/main" id="{B282AD2E-2AB3-400F-A4F2-3B2E17E02278}"/>
+              </a:ext>
+            </a:extLst>
+          </p:cNvPr>
+          <p:cNvSpPr>
+            <a:spLocks noGrp="1"/>
+          </p:cNvSpPr>
+          <p:nvPr>
+            <p:ph idx="1"/>
+          </p:nvPr>
+        </p:nvSpPr>
+        <p:spPr/>
+        <p:txBody>
+          <a:bodyPr>
+            <a:normAutofit/>
+          </a:bodyPr>
+          <a:lstStyle/>
+          <a:p>
+            <a:r>
+              <a:rPr lang="en-GB" dirty="0"/>
+              <a:t>Current ActiveMQ 5.X </a:t>
+            </a:r>
+          </a:p>
+          <a:p>
+            <a:r>
+              <a:rPr lang="en-GB" dirty="0"/>
+              <a:t>Will be replaced by ActiveMQ Artemis </a:t>
+            </a:r>
+            <a:r>
+              <a:rPr lang="en-GB" dirty="0">
+                <a:sym typeface="Wingdings" panose="05000000000000000000" pitchFamily="2" charset="2"/>
+              </a:rPr>
+              <a:t> ActiveMQ 6.X</a:t>
+            </a:r>
+          </a:p>
+          <a:p>
+            <a:r>
+              <a:rPr lang="en-GB" dirty="0"/>
+              <a:t>ActiveMQ Artemis has more potential</a:t>
+            </a:r>
+          </a:p>
+          <a:p>
+            <a:endParaRPr lang="en-GB" dirty="0"/>
+          </a:p>
+          <a:p>
+            <a:endParaRPr lang="en-GB" dirty="0"/>
+          </a:p>
+          <a:p>
+            <a:pPr marL="0" indent="0">
+              <a:buNone/>
+            </a:pPr>
+            <a:endParaRPr lang="en-GB" dirty="0"/>
+          </a:p>
+          <a:p>
+            <a:pPr marL="0" indent="0">
+              <a:buNone/>
+            </a:pPr>
+            <a:endParaRPr lang="en-GB" dirty="0"/>
+          </a:p>
+          <a:p>
+            <a:pPr marL="0" indent="0">
+              <a:buNone/>
+            </a:pPr>
+            <a:r>
+              <a:rPr lang="en-GB" sz="1200" dirty="0"/>
+              <a:t>									source: </a:t>
+            </a:r>
+            <a:r>
+              <a:rPr lang="en-GB" sz="1200" dirty="0">
+                <a:hlinkClick r:id="rId2"/>
+              </a:rPr>
+              <a:t>activemq.apache.org</a:t>
+            </a:r>
+            <a:endParaRPr lang="en-GB" sz="1200" dirty="0"/>
+          </a:p>
+        </p:txBody>
+      </p:sp>
+    </p:spTree>
+    <p:extLst>
+      <p:ext uri="{BB962C8B-B14F-4D97-AF65-F5344CB8AC3E}">
+        <p14:creationId xmlns:p14="http://schemas.microsoft.com/office/powerpoint/2010/main" val="3621271879"/>
       </p:ext>
     </p:extLst>
   </p:cSld>
@@ -4968,6 +5110,106 @@
 <file path=ppt/slides/slide5.xml><?xml version="1.0" encoding="utf-8"?>
 <p:sld xmlns:a="http://schemas.openxmlformats.org/drawingml/2006/main" xmlns:r="http://schemas.openxmlformats.org/officeDocument/2006/relationships" xmlns:p="http://schemas.openxmlformats.org/presentationml/2006/main">
   <p:cSld>
+    <p:spTree>
+      <p:nvGrpSpPr>
+        <p:cNvPr id="1" name=""/>
+        <p:cNvGrpSpPr/>
+        <p:nvPr/>
+      </p:nvGrpSpPr>
+      <p:grpSpPr>
+        <a:xfrm>
+          <a:off x="0" y="0"/>
+          <a:ext cx="0" cy="0"/>
+          <a:chOff x="0" y="0"/>
+          <a:chExt cx="0" cy="0"/>
+        </a:xfrm>
+      </p:grpSpPr>
+      <p:sp>
+        <p:nvSpPr>
+          <p:cNvPr id="2" name="Title 1">
+            <a:extLst>
+              <a:ext uri="{FF2B5EF4-FFF2-40B4-BE49-F238E27FC236}">
+                <a16:creationId xmlns:a16="http://schemas.microsoft.com/office/drawing/2014/main" id="{15A3F32B-8E45-4C63-8DBD-F23E49A08A1D}"/>
+              </a:ext>
+            </a:extLst>
+          </p:cNvPr>
+          <p:cNvSpPr>
+            <a:spLocks noGrp="1"/>
+          </p:cNvSpPr>
+          <p:nvPr>
+            <p:ph type="title"/>
+          </p:nvPr>
+        </p:nvSpPr>
+        <p:spPr/>
+        <p:txBody>
+          <a:bodyPr/>
+          <a:lstStyle/>
+          <a:p>
+            <a:r>
+              <a:rPr lang="en-GB" dirty="0"/>
+              <a:t>What happens when a message is Acknowledged?</a:t>
+            </a:r>
+          </a:p>
+        </p:txBody>
+      </p:sp>
+      <p:sp>
+        <p:nvSpPr>
+          <p:cNvPr id="3" name="Content Placeholder 2">
+            <a:extLst>
+              <a:ext uri="{FF2B5EF4-FFF2-40B4-BE49-F238E27FC236}">
+                <a16:creationId xmlns:a16="http://schemas.microsoft.com/office/drawing/2014/main" id="{978B66FF-5503-448B-BA39-D3A04A2F456A}"/>
+              </a:ext>
+            </a:extLst>
+          </p:cNvPr>
+          <p:cNvSpPr>
+            <a:spLocks noGrp="1"/>
+          </p:cNvSpPr>
+          <p:nvPr>
+            <p:ph idx="1"/>
+          </p:nvPr>
+        </p:nvSpPr>
+        <p:spPr/>
+        <p:txBody>
+          <a:bodyPr/>
+          <a:lstStyle/>
+          <a:p>
+            <a:pPr marL="0" indent="0">
+              <a:buNone/>
+            </a:pPr>
+            <a:endParaRPr lang="en-GB" dirty="0"/>
+          </a:p>
+          <a:p>
+            <a:r>
+              <a:rPr lang="en-GB" dirty="0"/>
+              <a:t>Once the broker receives signal that a message has been acknowledged it removes it from the persistence storage unit (</a:t>
+            </a:r>
+            <a:r>
+              <a:rPr lang="en-GB" dirty="0" err="1"/>
+              <a:t>KahaDB</a:t>
+            </a:r>
+            <a:r>
+              <a:rPr lang="en-GB" dirty="0"/>
+              <a:t>)</a:t>
+            </a:r>
+          </a:p>
+        </p:txBody>
+      </p:sp>
+    </p:spTree>
+    <p:extLst>
+      <p:ext uri="{BB962C8B-B14F-4D97-AF65-F5344CB8AC3E}">
+        <p14:creationId xmlns:p14="http://schemas.microsoft.com/office/powerpoint/2010/main" val="1958420787"/>
+      </p:ext>
+    </p:extLst>
+  </p:cSld>
+  <p:clrMapOvr>
+    <a:masterClrMapping/>
+  </p:clrMapOvr>
+</p:sld>
+</file>
+
+<file path=ppt/slides/slide6.xml><?xml version="1.0" encoding="utf-8"?>
+<p:sld xmlns:a="http://schemas.openxmlformats.org/drawingml/2006/main" xmlns:r="http://schemas.openxmlformats.org/officeDocument/2006/relationships" xmlns:p="http://schemas.openxmlformats.org/presentationml/2006/main">
+  <p:cSld>
     <p:bg>
       <p:bgPr>
         <a:solidFill>
@@ -5149,7 +5391,7 @@
 </p:sld>
 </file>
 
-<file path=ppt/slides/slide6.xml><?xml version="1.0" encoding="utf-8"?>
+<file path=ppt/slides/slide7.xml><?xml version="1.0" encoding="utf-8"?>
 <p:sld xmlns:a="http://schemas.openxmlformats.org/drawingml/2006/main" xmlns:r="http://schemas.openxmlformats.org/officeDocument/2006/relationships" xmlns:p="http://schemas.openxmlformats.org/presentationml/2006/main">
   <p:cSld>
     <p:spTree>
@@ -5171,6 +5413,99 @@
           <p:cNvPr id="2" name="Title 1">
             <a:extLst>
               <a:ext uri="{FF2B5EF4-FFF2-40B4-BE49-F238E27FC236}">
+                <a16:creationId xmlns:a16="http://schemas.microsoft.com/office/drawing/2014/main" id="{B7480BC8-A8AC-403C-815F-ABB7F66BF34F}"/>
+              </a:ext>
+            </a:extLst>
+          </p:cNvPr>
+          <p:cNvSpPr>
+            <a:spLocks noGrp="1"/>
+          </p:cNvSpPr>
+          <p:nvPr>
+            <p:ph type="title"/>
+          </p:nvPr>
+        </p:nvSpPr>
+        <p:spPr/>
+        <p:txBody>
+          <a:bodyPr/>
+          <a:lstStyle/>
+          <a:p>
+            <a:r>
+              <a:rPr lang="en-GB" dirty="0"/>
+              <a:t>Main Functionality</a:t>
+            </a:r>
+          </a:p>
+        </p:txBody>
+      </p:sp>
+      <p:pic>
+        <p:nvPicPr>
+          <p:cNvPr id="5" name="Content Placeholder 4" descr="Diagram, schematic&#10;&#10;Description automatically generated">
+            <a:extLst>
+              <a:ext uri="{FF2B5EF4-FFF2-40B4-BE49-F238E27FC236}">
+                <a16:creationId xmlns:a16="http://schemas.microsoft.com/office/drawing/2014/main" id="{5CAF7FAB-0B50-4181-ACEF-13757809A25B}"/>
+              </a:ext>
+            </a:extLst>
+          </p:cNvPr>
+          <p:cNvPicPr>
+            <a:picLocks noGrp="1" noChangeAspect="1"/>
+          </p:cNvPicPr>
+          <p:nvPr>
+            <p:ph idx="1"/>
+          </p:nvPr>
+        </p:nvPicPr>
+        <p:blipFill>
+          <a:blip r:embed="rId2">
+            <a:extLst>
+              <a:ext uri="{28A0092B-C50C-407E-A947-70E740481C1C}">
+                <a14:useLocalDpi xmlns:a14="http://schemas.microsoft.com/office/drawing/2010/main" val="0"/>
+              </a:ext>
+            </a:extLst>
+          </a:blip>
+          <a:stretch>
+            <a:fillRect/>
+          </a:stretch>
+        </p:blipFill>
+        <p:spPr>
+          <a:xfrm>
+            <a:off x="3532204" y="1825625"/>
+            <a:ext cx="5127592" cy="4351338"/>
+          </a:xfrm>
+        </p:spPr>
+      </p:pic>
+    </p:spTree>
+    <p:extLst>
+      <p:ext uri="{BB962C8B-B14F-4D97-AF65-F5344CB8AC3E}">
+        <p14:creationId xmlns:p14="http://schemas.microsoft.com/office/powerpoint/2010/main" val="827049895"/>
+      </p:ext>
+    </p:extLst>
+  </p:cSld>
+  <p:clrMapOvr>
+    <a:masterClrMapping/>
+  </p:clrMapOvr>
+</p:sld>
+</file>
+
+<file path=ppt/slides/slide8.xml><?xml version="1.0" encoding="utf-8"?>
+<p:sld xmlns:a="http://schemas.openxmlformats.org/drawingml/2006/main" xmlns:r="http://schemas.openxmlformats.org/officeDocument/2006/relationships" xmlns:p="http://schemas.openxmlformats.org/presentationml/2006/main">
+  <p:cSld>
+    <p:spTree>
+      <p:nvGrpSpPr>
+        <p:cNvPr id="1" name=""/>
+        <p:cNvGrpSpPr/>
+        <p:nvPr/>
+      </p:nvGrpSpPr>
+      <p:grpSpPr>
+        <a:xfrm>
+          <a:off x="0" y="0"/>
+          <a:ext cx="0" cy="0"/>
+          <a:chOff x="0" y="0"/>
+          <a:chExt cx="0" cy="0"/>
+        </a:xfrm>
+      </p:grpSpPr>
+      <p:sp>
+        <p:nvSpPr>
+          <p:cNvPr id="2" name="Title 1">
+            <a:extLst>
+              <a:ext uri="{FF2B5EF4-FFF2-40B4-BE49-F238E27FC236}">
                 <a16:creationId xmlns:a16="http://schemas.microsoft.com/office/drawing/2014/main" id="{96075AE1-2DAD-4679-A98C-B24BCB9BF35D}"/>
               </a:ext>
             </a:extLst>
@@ -5188,40 +5523,51 @@
           <a:lstStyle/>
           <a:p>
             <a:r>
-              <a:rPr lang="en-GB" dirty="0"/>
-              <a:t>Application Sequence</a:t>
-            </a:r>
-          </a:p>
-        </p:txBody>
-      </p:sp>
-      <p:sp>
-        <p:nvSpPr>
-          <p:cNvPr id="3" name="Content Placeholder 2">
-            <a:extLst>
-              <a:ext uri="{FF2B5EF4-FFF2-40B4-BE49-F238E27FC236}">
-                <a16:creationId xmlns:a16="http://schemas.microsoft.com/office/drawing/2014/main" id="{369B18C4-D5E4-452A-BFA9-E25D041AC313}"/>
-              </a:ext>
-            </a:extLst>
-          </p:cNvPr>
-          <p:cNvSpPr>
-            <a:spLocks noGrp="1"/>
-          </p:cNvSpPr>
+              <a:rPr lang="en-GB"/>
+              <a:t>Thread creation</a:t>
+            </a:r>
+            <a:endParaRPr lang="en-GB" dirty="0"/>
+          </a:p>
+        </p:txBody>
+      </p:sp>
+      <p:pic>
+        <p:nvPicPr>
+          <p:cNvPr id="5" name="Content Placeholder 4">
+            <a:extLst>
+              <a:ext uri="{FF2B5EF4-FFF2-40B4-BE49-F238E27FC236}">
+                <a16:creationId xmlns:a16="http://schemas.microsoft.com/office/drawing/2014/main" id="{AC6E6641-F4BD-434A-B28F-AC0E609BD62C}"/>
+              </a:ext>
+            </a:extLst>
+          </p:cNvPr>
+          <p:cNvPicPr>
+            <a:picLocks noGrp="1" noChangeAspect="1"/>
+          </p:cNvPicPr>
           <p:nvPr>
             <p:ph idx="1"/>
           </p:nvPr>
-        </p:nvSpPr>
-        <p:spPr/>
-        <p:txBody>
-          <a:bodyPr/>
-          <a:lstStyle/>
-          <a:p>
-            <a:pPr marL="0" indent="0">
-              <a:buNone/>
-            </a:pPr>
-            <a:endParaRPr lang="en-GB" dirty="0"/>
-          </a:p>
-        </p:txBody>
-      </p:sp>
+        </p:nvPicPr>
+        <p:blipFill>
+          <a:blip r:embed="rId2">
+            <a:extLst>
+              <a:ext uri="{28A0092B-C50C-407E-A947-70E740481C1C}">
+                <a14:useLocalDpi xmlns:a14="http://schemas.microsoft.com/office/drawing/2010/main" val="0"/>
+              </a:ext>
+              <a:ext uri="{96DAC541-7B7A-43D3-8B79-37D633B846F1}">
+                <asvg:svgBlip xmlns:asvg="http://schemas.microsoft.com/office/drawing/2016/SVG/main" r:embed="rId3"/>
+              </a:ext>
+            </a:extLst>
+          </a:blip>
+          <a:stretch>
+            <a:fillRect/>
+          </a:stretch>
+        </p:blipFill>
+        <p:spPr>
+          <a:xfrm>
+            <a:off x="838200" y="2439616"/>
+            <a:ext cx="10515600" cy="3123356"/>
+          </a:xfrm>
+        </p:spPr>
+      </p:pic>
     </p:spTree>
     <p:extLst>
       <p:ext uri="{BB962C8B-B14F-4D97-AF65-F5344CB8AC3E}">
@@ -5235,7 +5581,7 @@
 </p:sld>
 </file>
 
-<file path=ppt/slides/slide7.xml><?xml version="1.0" encoding="utf-8"?>
+<file path=ppt/slides/slide9.xml><?xml version="1.0" encoding="utf-8"?>
 <p:sld xmlns:a="http://schemas.openxmlformats.org/drawingml/2006/main" xmlns:r="http://schemas.openxmlformats.org/officeDocument/2006/relationships" xmlns:p="http://schemas.openxmlformats.org/presentationml/2006/main">
   <p:cSld>
     <p:bg>
@@ -5764,146 +6110,6 @@
     <p:extLst>
       <p:ext uri="{BB962C8B-B14F-4D97-AF65-F5344CB8AC3E}">
         <p14:creationId xmlns:p14="http://schemas.microsoft.com/office/powerpoint/2010/main" val="1163713778"/>
-      </p:ext>
-    </p:extLst>
-  </p:cSld>
-  <p:clrMapOvr>
-    <a:masterClrMapping/>
-  </p:clrMapOvr>
-</p:sld>
-</file>
-
-<file path=ppt/slides/slide8.xml><?xml version="1.0" encoding="utf-8"?>
-<p:sld xmlns:a="http://schemas.openxmlformats.org/drawingml/2006/main" xmlns:r="http://schemas.openxmlformats.org/officeDocument/2006/relationships" xmlns:p="http://schemas.openxmlformats.org/presentationml/2006/main">
-  <p:cSld>
-    <p:spTree>
-      <p:nvGrpSpPr>
-        <p:cNvPr id="1" name=""/>
-        <p:cNvGrpSpPr/>
-        <p:nvPr/>
-      </p:nvGrpSpPr>
-      <p:grpSpPr>
-        <a:xfrm>
-          <a:off x="0" y="0"/>
-          <a:ext cx="0" cy="0"/>
-          <a:chOff x="0" y="0"/>
-          <a:chExt cx="0" cy="0"/>
-        </a:xfrm>
-      </p:grpSpPr>
-      <p:sp>
-        <p:nvSpPr>
-          <p:cNvPr id="2" name="Title 1">
-            <a:extLst>
-              <a:ext uri="{FF2B5EF4-FFF2-40B4-BE49-F238E27FC236}">
-                <a16:creationId xmlns:a16="http://schemas.microsoft.com/office/drawing/2014/main" id="{7905FCBB-5F96-4436-B97D-E0449C7FEF0D}"/>
-              </a:ext>
-            </a:extLst>
-          </p:cNvPr>
-          <p:cNvSpPr>
-            <a:spLocks noGrp="1"/>
-          </p:cNvSpPr>
-          <p:nvPr>
-            <p:ph type="title"/>
-          </p:nvPr>
-        </p:nvSpPr>
-        <p:spPr/>
-        <p:txBody>
-          <a:bodyPr/>
-          <a:lstStyle/>
-          <a:p>
-            <a:r>
-              <a:rPr lang="en-GB" dirty="0"/>
-              <a:t>Future of ActiveMQ</a:t>
-            </a:r>
-          </a:p>
-        </p:txBody>
-      </p:sp>
-      <p:sp>
-        <p:nvSpPr>
-          <p:cNvPr id="3" name="Content Placeholder 2">
-            <a:extLst>
-              <a:ext uri="{FF2B5EF4-FFF2-40B4-BE49-F238E27FC236}">
-                <a16:creationId xmlns:a16="http://schemas.microsoft.com/office/drawing/2014/main" id="{B282AD2E-2AB3-400F-A4F2-3B2E17E02278}"/>
-              </a:ext>
-            </a:extLst>
-          </p:cNvPr>
-          <p:cNvSpPr>
-            <a:spLocks noGrp="1"/>
-          </p:cNvSpPr>
-          <p:nvPr>
-            <p:ph idx="1"/>
-          </p:nvPr>
-        </p:nvSpPr>
-        <p:spPr/>
-        <p:txBody>
-          <a:bodyPr>
-            <a:normAutofit/>
-          </a:bodyPr>
-          <a:lstStyle/>
-          <a:p>
-            <a:r>
-              <a:rPr lang="en-GB" dirty="0"/>
-              <a:t>Current ActiveMQ 5.X </a:t>
-            </a:r>
-          </a:p>
-          <a:p>
-            <a:r>
-              <a:rPr lang="en-GB" dirty="0"/>
-              <a:t>Will be replaced by ActiveMQ Artemis </a:t>
-            </a:r>
-            <a:r>
-              <a:rPr lang="en-GB" dirty="0">
-                <a:sym typeface="Wingdings" panose="05000000000000000000" pitchFamily="2" charset="2"/>
-              </a:rPr>
-              <a:t> ActiveMQ 6.X</a:t>
-            </a:r>
-          </a:p>
-          <a:p>
-            <a:r>
-              <a:rPr lang="en-GB" dirty="0"/>
-              <a:t>ActiveMQ Artemis has more potential</a:t>
-            </a:r>
-          </a:p>
-          <a:p>
-            <a:endParaRPr lang="en-GB" dirty="0"/>
-          </a:p>
-          <a:p>
-            <a:endParaRPr lang="en-GB" dirty="0"/>
-          </a:p>
-          <a:p>
-            <a:pPr marL="0" indent="0">
-              <a:buNone/>
-            </a:pPr>
-            <a:endParaRPr lang="en-GB" dirty="0"/>
-          </a:p>
-          <a:p>
-            <a:pPr marL="0" indent="0">
-              <a:buNone/>
-            </a:pPr>
-            <a:endParaRPr lang="en-GB" dirty="0"/>
-          </a:p>
-          <a:p>
-            <a:pPr marL="0" indent="0">
-              <a:buNone/>
-            </a:pPr>
-            <a:r>
-              <a:rPr lang="en-GB" sz="1200" dirty="0"/>
-              <a:t>									source: </a:t>
-            </a:r>
-            <a:r>
-              <a:rPr lang="en-GB" sz="1200" dirty="0">
-                <a:hlinkClick r:id="rId2"/>
-              </a:rPr>
-              <a:t>activemq.apache.org</a:t>
-            </a:r>
-            <a:endParaRPr lang="en-GB" sz="1200" dirty="0"/>
-          </a:p>
-        </p:txBody>
-      </p:sp>
-    </p:spTree>
-    <p:extLst>
-      <p:ext uri="{BB962C8B-B14F-4D97-AF65-F5344CB8AC3E}">
-        <p14:creationId xmlns:p14="http://schemas.microsoft.com/office/powerpoint/2010/main" val="3621271879"/>
       </p:ext>
     </p:extLst>
   </p:cSld>

</xml_diff>